<commit_message>
new top drivers plot
</commit_message>
<xml_diff>
--- a/Presentation/F1_Presentation_Moyo_Majak.pptx
+++ b/Presentation/F1_Presentation_Moyo_Majak.pptx
@@ -5,7 +5,7 @@
     <p:sldMasterId id="2147483648" r:id="rId1"/>
   </p:sldMasterIdLst>
   <p:notesMasterIdLst>
-    <p:notesMasterId r:id="rId14"/>
+    <p:notesMasterId r:id="rId15"/>
   </p:notesMasterIdLst>
   <p:sldIdLst>
     <p:sldId id="256" r:id="rId2"/>
@@ -13,13 +13,14 @@
     <p:sldId id="258" r:id="rId4"/>
     <p:sldId id="260" r:id="rId5"/>
     <p:sldId id="259" r:id="rId6"/>
-    <p:sldId id="264" r:id="rId7"/>
-    <p:sldId id="262" r:id="rId8"/>
-    <p:sldId id="261" r:id="rId9"/>
-    <p:sldId id="265" r:id="rId10"/>
-    <p:sldId id="263" r:id="rId11"/>
-    <p:sldId id="266" r:id="rId12"/>
-    <p:sldId id="267" r:id="rId13"/>
+    <p:sldId id="268" r:id="rId7"/>
+    <p:sldId id="264" r:id="rId8"/>
+    <p:sldId id="262" r:id="rId9"/>
+    <p:sldId id="261" r:id="rId10"/>
+    <p:sldId id="265" r:id="rId11"/>
+    <p:sldId id="263" r:id="rId12"/>
+    <p:sldId id="266" r:id="rId13"/>
+    <p:sldId id="267" r:id="rId14"/>
   </p:sldIdLst>
   <p:sldSz cx="12192000" cy="6858000"/>
   <p:notesSz cx="6858000" cy="9144000"/>
@@ -208,7 +209,7 @@
           <a:p>
             <a:fld id="{B3CDF40C-5A9A-4B37-9F4E-A337933060DF}" type="datetimeFigureOut">
               <a:rPr lang="en-US" smtClean="0"/>
-              <a:t>1/20/2021</a:t>
+              <a:t>1/20/21</a:t>
             </a:fld>
             <a:endParaRPr lang="en-US"/>
           </a:p>
@@ -1061,7 +1062,27 @@
                 <a:effectLst/>
                 <a:latin typeface="Segoe UI Historic" panose="020B0502040204020203" pitchFamily="34" charset="0"/>
               </a:rPr>
-              <a:t>accumulated sum of points for top 10 contractors over the years</a:t>
+              <a:t>accumulated sum of points for top 10 </a:t>
+            </a:r>
+            <a:r>
+              <a:rPr lang="en-US" b="0" i="0" dirty="0" err="1">
+                <a:solidFill>
+                  <a:srgbClr val="050505"/>
+                </a:solidFill>
+                <a:effectLst/>
+                <a:latin typeface="Segoe UI Historic" panose="020B0502040204020203" pitchFamily="34" charset="0"/>
+              </a:rPr>
+              <a:t>constractors</a:t>
+            </a:r>
+            <a:r>
+              <a:rPr lang="en-US" b="0" i="0" dirty="0">
+                <a:solidFill>
+                  <a:srgbClr val="050505"/>
+                </a:solidFill>
+                <a:effectLst/>
+                <a:latin typeface="Segoe UI Historic" panose="020B0502040204020203" pitchFamily="34" charset="0"/>
+              </a:rPr>
+              <a:t> over the years</a:t>
             </a:r>
           </a:p>
           <a:p>
@@ -1085,27 +1106,7 @@
                 <a:effectLst/>
                 <a:latin typeface="Segoe UI Historic" panose="020B0502040204020203" pitchFamily="34" charset="0"/>
               </a:rPr>
-              <a:t>The Ferrari has the  </a:t>
-            </a:r>
-            <a:r>
-              <a:rPr lang="en-US" b="0" i="0" dirty="0" err="1">
-                <a:solidFill>
-                  <a:srgbClr val="050505"/>
-                </a:solidFill>
-                <a:effectLst/>
-                <a:latin typeface="Segoe UI Historic" panose="020B0502040204020203" pitchFamily="34" charset="0"/>
-              </a:rPr>
-              <a:t>highet</a:t>
-            </a:r>
-            <a:r>
-              <a:rPr lang="en-US" b="0" i="0" dirty="0">
-                <a:solidFill>
-                  <a:srgbClr val="050505"/>
-                </a:solidFill>
-                <a:effectLst/>
-                <a:latin typeface="Segoe UI Historic" panose="020B0502040204020203" pitchFamily="34" charset="0"/>
-              </a:rPr>
-              <a:t> number of accumulated points</a:t>
+              <a:t>The Ferrari has the  highest number of accumulated points</a:t>
             </a:r>
           </a:p>
           <a:p>
@@ -1168,7 +1169,7 @@
       </p:grpSpPr>
       <p:sp>
         <p:nvSpPr>
-          <p:cNvPr id="2" name="Slide Image Placeholder 1"/>
+          <p:cNvPr id="2" name="Symbol zastępczy obrazu slajdu 1"/>
           <p:cNvSpPr>
             <a:spLocks noGrp="1" noRot="1" noChangeAspect="1"/>
           </p:cNvSpPr>
@@ -1180,7 +1181,7 @@
       </p:sp>
       <p:sp>
         <p:nvSpPr>
-          <p:cNvPr id="3" name="Notes Placeholder 2"/>
+          <p:cNvPr id="3" name="Symbol zastępczy notatek 2"/>
           <p:cNvSpPr>
             <a:spLocks noGrp="1"/>
           </p:cNvSpPr>
@@ -1193,35 +1194,13 @@
           <a:bodyPr/>
           <a:lstStyle/>
           <a:p>
-            <a:r>
-              <a:rPr lang="en-US" b="0" i="0" dirty="0">
-                <a:solidFill>
-                  <a:srgbClr val="222222"/>
-                </a:solidFill>
-                <a:effectLst/>
-                <a:latin typeface="Arial" panose="020B0604020202020204" pitchFamily="34" charset="0"/>
-              </a:rPr>
-              <a:t>Do the differences between the cars decrease over the years?</a:t>
-            </a:r>
-          </a:p>
-          <a:p>
-            <a:r>
-              <a:rPr lang="en-US" b="0" i="0" dirty="0">
-                <a:solidFill>
-                  <a:srgbClr val="222222"/>
-                </a:solidFill>
-                <a:effectLst/>
-                <a:latin typeface="Arial" panose="020B0604020202020204" pitchFamily="34" charset="0"/>
-              </a:rPr>
-              <a:t>To answer this question we have used a plot that shows the differences in the number of cars in the past years</a:t>
-            </a:r>
-            <a:endParaRPr lang="en-US" dirty="0"/>
-          </a:p>
-        </p:txBody>
-      </p:sp>
-      <p:sp>
-        <p:nvSpPr>
-          <p:cNvPr id="4" name="Slide Number Placeholder 3"/>
+            <a:endParaRPr lang="pl-PL"/>
+          </a:p>
+        </p:txBody>
+      </p:sp>
+      <p:sp>
+        <p:nvSpPr>
+          <p:cNvPr id="4" name="Symbol zastępczy numeru slajdu 3"/>
           <p:cNvSpPr>
             <a:spLocks noGrp="1"/>
           </p:cNvSpPr>
@@ -1236,7 +1215,7 @@
           <a:p>
             <a:fld id="{8B16C77F-3968-400F-9FFF-E15A5979D213}" type="slidenum">
               <a:rPr lang="en-US" smtClean="0"/>
-              <a:t>7</a:t>
+              <a:t>6</a:t>
             </a:fld>
             <a:endParaRPr lang="en-US"/>
           </a:p>
@@ -1245,7 +1224,7 @@
     </p:spTree>
     <p:extLst>
       <p:ext uri="{BB962C8B-B14F-4D97-AF65-F5344CB8AC3E}">
-        <p14:creationId xmlns:p14="http://schemas.microsoft.com/office/powerpoint/2010/main" val="500560726"/>
+        <p14:creationId xmlns:p14="http://schemas.microsoft.com/office/powerpoint/2010/main" val="4221663633"/>
       </p:ext>
     </p:extLst>
   </p:cSld>
@@ -1307,13 +1286,19 @@
                 <a:effectLst/>
                 <a:latin typeface="Arial" panose="020B0604020202020204" pitchFamily="34" charset="0"/>
               </a:rPr>
-              <a:t>Is F1 currently being won in qualifying?</a:t>
-            </a:r>
-          </a:p>
-          <a:p>
-            <a:r>
-              <a:rPr lang="en-ZW" dirty="0"/>
-              <a:t>This plot shows a </a:t>
+              <a:t>Do the differences between the cars decrease over the years?</a:t>
+            </a:r>
+          </a:p>
+          <a:p>
+            <a:r>
+              <a:rPr lang="en-US" b="0" i="0" dirty="0">
+                <a:solidFill>
+                  <a:srgbClr val="222222"/>
+                </a:solidFill>
+                <a:effectLst/>
+                <a:latin typeface="Arial" panose="020B0604020202020204" pitchFamily="34" charset="0"/>
+              </a:rPr>
+              <a:t>To answer this question we have used a plot that shows the differences in the number of cars in the past years</a:t>
             </a:r>
             <a:endParaRPr lang="en-US" dirty="0"/>
           </a:p>
@@ -1337,6 +1322,106 @@
             <a:fld id="{8B16C77F-3968-400F-9FFF-E15A5979D213}" type="slidenum">
               <a:rPr lang="en-US" smtClean="0"/>
               <a:t>8</a:t>
+            </a:fld>
+            <a:endParaRPr lang="en-US"/>
+          </a:p>
+        </p:txBody>
+      </p:sp>
+    </p:spTree>
+    <p:extLst>
+      <p:ext uri="{BB962C8B-B14F-4D97-AF65-F5344CB8AC3E}">
+        <p14:creationId xmlns:p14="http://schemas.microsoft.com/office/powerpoint/2010/main" val="500560726"/>
+      </p:ext>
+    </p:extLst>
+  </p:cSld>
+  <p:clrMapOvr>
+    <a:masterClrMapping/>
+  </p:clrMapOvr>
+</p:notes>
+</file>
+
+<file path=ppt/notesSlides/notesSlide7.xml><?xml version="1.0" encoding="utf-8"?>
+<p:notes xmlns:a="http://schemas.openxmlformats.org/drawingml/2006/main" xmlns:r="http://schemas.openxmlformats.org/officeDocument/2006/relationships" xmlns:p="http://schemas.openxmlformats.org/presentationml/2006/main">
+  <p:cSld>
+    <p:spTree>
+      <p:nvGrpSpPr>
+        <p:cNvPr id="1" name=""/>
+        <p:cNvGrpSpPr/>
+        <p:nvPr/>
+      </p:nvGrpSpPr>
+      <p:grpSpPr>
+        <a:xfrm>
+          <a:off x="0" y="0"/>
+          <a:ext cx="0" cy="0"/>
+          <a:chOff x="0" y="0"/>
+          <a:chExt cx="0" cy="0"/>
+        </a:xfrm>
+      </p:grpSpPr>
+      <p:sp>
+        <p:nvSpPr>
+          <p:cNvPr id="2" name="Slide Image Placeholder 1"/>
+          <p:cNvSpPr>
+            <a:spLocks noGrp="1" noRot="1" noChangeAspect="1"/>
+          </p:cNvSpPr>
+          <p:nvPr>
+            <p:ph type="sldImg"/>
+          </p:nvPr>
+        </p:nvSpPr>
+        <p:spPr/>
+      </p:sp>
+      <p:sp>
+        <p:nvSpPr>
+          <p:cNvPr id="3" name="Notes Placeholder 2"/>
+          <p:cNvSpPr>
+            <a:spLocks noGrp="1"/>
+          </p:cNvSpPr>
+          <p:nvPr>
+            <p:ph type="body" idx="1"/>
+          </p:nvPr>
+        </p:nvSpPr>
+        <p:spPr/>
+        <p:txBody>
+          <a:bodyPr/>
+          <a:lstStyle/>
+          <a:p>
+            <a:r>
+              <a:rPr lang="en-US" b="0" i="0" dirty="0">
+                <a:solidFill>
+                  <a:srgbClr val="222222"/>
+                </a:solidFill>
+                <a:effectLst/>
+                <a:latin typeface="Arial" panose="020B0604020202020204" pitchFamily="34" charset="0"/>
+              </a:rPr>
+              <a:t>Is F1 currently being won in qualifying?</a:t>
+            </a:r>
+          </a:p>
+          <a:p>
+            <a:r>
+              <a:rPr lang="en-ZW" dirty="0"/>
+              <a:t>This plot shows a </a:t>
+            </a:r>
+            <a:endParaRPr lang="en-US" dirty="0"/>
+          </a:p>
+        </p:txBody>
+      </p:sp>
+      <p:sp>
+        <p:nvSpPr>
+          <p:cNvPr id="4" name="Slide Number Placeholder 3"/>
+          <p:cNvSpPr>
+            <a:spLocks noGrp="1"/>
+          </p:cNvSpPr>
+          <p:nvPr>
+            <p:ph type="sldNum" sz="quarter" idx="5"/>
+          </p:nvPr>
+        </p:nvSpPr>
+        <p:spPr/>
+        <p:txBody>
+          <a:bodyPr/>
+          <a:lstStyle/>
+          <a:p>
+            <a:fld id="{8B16C77F-3968-400F-9FFF-E15A5979D213}" type="slidenum">
+              <a:rPr lang="en-US" smtClean="0"/>
+              <a:t>9</a:t>
             </a:fld>
             <a:endParaRPr lang="en-US"/>
           </a:p>
@@ -1510,7 +1595,7 @@
           <a:p>
             <a:fld id="{276D79ED-3FA7-4EF8-964B-EB8BCFAB02F8}" type="datetimeFigureOut">
               <a:rPr lang="en-US" smtClean="0"/>
-              <a:t>1/20/2021</a:t>
+              <a:t>1/20/21</a:t>
             </a:fld>
             <a:endParaRPr lang="en-US"/>
           </a:p>
@@ -1680,7 +1765,7 @@
           <a:p>
             <a:fld id="{276D79ED-3FA7-4EF8-964B-EB8BCFAB02F8}" type="datetimeFigureOut">
               <a:rPr lang="en-US" smtClean="0"/>
-              <a:t>1/20/2021</a:t>
+              <a:t>1/20/21</a:t>
             </a:fld>
             <a:endParaRPr lang="en-US"/>
           </a:p>
@@ -1926,7 +2011,7 @@
           <a:p>
             <a:fld id="{276D79ED-3FA7-4EF8-964B-EB8BCFAB02F8}" type="datetimeFigureOut">
               <a:rPr lang="en-US" smtClean="0"/>
-              <a:t>1/20/2021</a:t>
+              <a:t>1/20/21</a:t>
             </a:fld>
             <a:endParaRPr lang="en-US"/>
           </a:p>
@@ -2158,7 +2243,7 @@
           <a:p>
             <a:fld id="{276D79ED-3FA7-4EF8-964B-EB8BCFAB02F8}" type="datetimeFigureOut">
               <a:rPr lang="en-US" smtClean="0"/>
-              <a:t>1/20/2021</a:t>
+              <a:t>1/20/21</a:t>
             </a:fld>
             <a:endParaRPr lang="en-US"/>
           </a:p>
@@ -2525,7 +2610,7 @@
           <a:p>
             <a:fld id="{276D79ED-3FA7-4EF8-964B-EB8BCFAB02F8}" type="datetimeFigureOut">
               <a:rPr lang="en-US" smtClean="0"/>
-              <a:t>1/20/2021</a:t>
+              <a:t>1/20/21</a:t>
             </a:fld>
             <a:endParaRPr lang="en-US"/>
           </a:p>
@@ -2643,7 +2728,7 @@
           <a:p>
             <a:fld id="{276D79ED-3FA7-4EF8-964B-EB8BCFAB02F8}" type="datetimeFigureOut">
               <a:rPr lang="en-US" smtClean="0"/>
-              <a:t>1/20/2021</a:t>
+              <a:t>1/20/21</a:t>
             </a:fld>
             <a:endParaRPr lang="en-US"/>
           </a:p>
@@ -2738,7 +2823,7 @@
           <a:p>
             <a:fld id="{276D79ED-3FA7-4EF8-964B-EB8BCFAB02F8}" type="datetimeFigureOut">
               <a:rPr lang="en-US" smtClean="0"/>
-              <a:t>1/20/2021</a:t>
+              <a:t>1/20/21</a:t>
             </a:fld>
             <a:endParaRPr lang="en-US"/>
           </a:p>
@@ -3015,7 +3100,7 @@
           <a:p>
             <a:fld id="{276D79ED-3FA7-4EF8-964B-EB8BCFAB02F8}" type="datetimeFigureOut">
               <a:rPr lang="en-US" smtClean="0"/>
-              <a:t>1/20/2021</a:t>
+              <a:t>1/20/21</a:t>
             </a:fld>
             <a:endParaRPr lang="en-US"/>
           </a:p>
@@ -3272,7 +3357,7 @@
           <a:p>
             <a:fld id="{276D79ED-3FA7-4EF8-964B-EB8BCFAB02F8}" type="datetimeFigureOut">
               <a:rPr lang="en-US" smtClean="0"/>
-              <a:t>1/20/2021</a:t>
+              <a:t>1/20/21</a:t>
             </a:fld>
             <a:endParaRPr lang="en-US"/>
           </a:p>
@@ -3493,7 +3578,7 @@
             <a:fld id="{276D79ED-3FA7-4EF8-964B-EB8BCFAB02F8}" type="datetimeFigureOut">
               <a:rPr lang="en-US" smtClean="0"/>
               <a:pPr/>
-              <a:t>1/20/2021</a:t>
+              <a:t>1/20/21</a:t>
             </a:fld>
             <a:endParaRPr lang="en-US"/>
           </a:p>
@@ -4107,7 +4192,7 @@
           <p:cNvPr id="2" name="Title 1">
             <a:extLst>
               <a:ext uri="{FF2B5EF4-FFF2-40B4-BE49-F238E27FC236}">
-                <a16:creationId xmlns:a16="http://schemas.microsoft.com/office/drawing/2014/main" id="{EEDF7E60-BEFF-4D9E-97E4-1C50543309DE}"/>
+                <a16:creationId xmlns:a16="http://schemas.microsoft.com/office/drawing/2014/main" id="{8F694C84-9122-407A-9335-7FF043C3E2A2}"/>
               </a:ext>
             </a:extLst>
           </p:cNvPr>
@@ -4123,17 +4208,7 @@
           <a:bodyPr/>
           <a:lstStyle/>
           <a:p>
-            <a:r>
-              <a:rPr lang="en-US" b="0" i="0" dirty="0">
-                <a:solidFill>
-                  <a:srgbClr val="222222"/>
-                </a:solidFill>
-                <a:effectLst/>
-                <a:latin typeface="Arial" panose="020B0604020202020204" pitchFamily="34" charset="0"/>
-              </a:rPr>
-              <a:t>Which F1 circuits provide a more even fight?</a:t>
-            </a:r>
-            <a:endParaRPr lang="en-US" dirty="0"/>
+            <a:endParaRPr lang="en-US"/>
           </a:p>
         </p:txBody>
       </p:sp>
@@ -4142,7 +4217,7 @@
           <p:cNvPr id="3" name="Content Placeholder 2">
             <a:extLst>
               <a:ext uri="{FF2B5EF4-FFF2-40B4-BE49-F238E27FC236}">
-                <a16:creationId xmlns:a16="http://schemas.microsoft.com/office/drawing/2014/main" id="{8938693A-BE4E-41A4-8570-AADF18D1A1A5}"/>
+                <a16:creationId xmlns:a16="http://schemas.microsoft.com/office/drawing/2014/main" id="{3367C7C9-20B6-4F7A-BF6E-D7967B105B94}"/>
               </a:ext>
             </a:extLst>
           </p:cNvPr>
@@ -4165,7 +4240,7 @@
     </p:spTree>
     <p:extLst>
       <p:ext uri="{BB962C8B-B14F-4D97-AF65-F5344CB8AC3E}">
-        <p14:creationId xmlns:p14="http://schemas.microsoft.com/office/powerpoint/2010/main" val="441530103"/>
+        <p14:creationId xmlns:p14="http://schemas.microsoft.com/office/powerpoint/2010/main" val="4132244438"/>
       </p:ext>
     </p:extLst>
   </p:cSld>
@@ -4197,6 +4272,96 @@
           <p:cNvPr id="2" name="Title 1">
             <a:extLst>
               <a:ext uri="{FF2B5EF4-FFF2-40B4-BE49-F238E27FC236}">
+                <a16:creationId xmlns:a16="http://schemas.microsoft.com/office/drawing/2014/main" id="{EEDF7E60-BEFF-4D9E-97E4-1C50543309DE}"/>
+              </a:ext>
+            </a:extLst>
+          </p:cNvPr>
+          <p:cNvSpPr>
+            <a:spLocks noGrp="1"/>
+          </p:cNvSpPr>
+          <p:nvPr>
+            <p:ph type="title"/>
+          </p:nvPr>
+        </p:nvSpPr>
+        <p:spPr/>
+        <p:txBody>
+          <a:bodyPr/>
+          <a:lstStyle/>
+          <a:p>
+            <a:r>
+              <a:rPr lang="en-US" b="0" i="0" dirty="0">
+                <a:solidFill>
+                  <a:srgbClr val="222222"/>
+                </a:solidFill>
+                <a:effectLst/>
+                <a:latin typeface="Arial" panose="020B0604020202020204" pitchFamily="34" charset="0"/>
+              </a:rPr>
+              <a:t>Which F1 circuits provide a more even fight?</a:t>
+            </a:r>
+            <a:endParaRPr lang="en-US" dirty="0"/>
+          </a:p>
+        </p:txBody>
+      </p:sp>
+      <p:sp>
+        <p:nvSpPr>
+          <p:cNvPr id="3" name="Content Placeholder 2">
+            <a:extLst>
+              <a:ext uri="{FF2B5EF4-FFF2-40B4-BE49-F238E27FC236}">
+                <a16:creationId xmlns:a16="http://schemas.microsoft.com/office/drawing/2014/main" id="{8938693A-BE4E-41A4-8570-AADF18D1A1A5}"/>
+              </a:ext>
+            </a:extLst>
+          </p:cNvPr>
+          <p:cNvSpPr>
+            <a:spLocks noGrp="1"/>
+          </p:cNvSpPr>
+          <p:nvPr>
+            <p:ph idx="1"/>
+          </p:nvPr>
+        </p:nvSpPr>
+        <p:spPr/>
+        <p:txBody>
+          <a:bodyPr/>
+          <a:lstStyle/>
+          <a:p>
+            <a:endParaRPr lang="en-US"/>
+          </a:p>
+        </p:txBody>
+      </p:sp>
+    </p:spTree>
+    <p:extLst>
+      <p:ext uri="{BB962C8B-B14F-4D97-AF65-F5344CB8AC3E}">
+        <p14:creationId xmlns:p14="http://schemas.microsoft.com/office/powerpoint/2010/main" val="441530103"/>
+      </p:ext>
+    </p:extLst>
+  </p:cSld>
+  <p:clrMapOvr>
+    <a:masterClrMapping/>
+  </p:clrMapOvr>
+</p:sld>
+</file>
+
+<file path=ppt/slides/slide12.xml><?xml version="1.0" encoding="utf-8"?>
+<p:sld xmlns:a="http://schemas.openxmlformats.org/drawingml/2006/main" xmlns:r="http://schemas.openxmlformats.org/officeDocument/2006/relationships" xmlns:p="http://schemas.openxmlformats.org/presentationml/2006/main">
+  <p:cSld>
+    <p:spTree>
+      <p:nvGrpSpPr>
+        <p:cNvPr id="1" name=""/>
+        <p:cNvGrpSpPr/>
+        <p:nvPr/>
+      </p:nvGrpSpPr>
+      <p:grpSpPr>
+        <a:xfrm>
+          <a:off x="0" y="0"/>
+          <a:ext cx="0" cy="0"/>
+          <a:chOff x="0" y="0"/>
+          <a:chExt cx="0" cy="0"/>
+        </a:xfrm>
+      </p:grpSpPr>
+      <p:sp>
+        <p:nvSpPr>
+          <p:cNvPr id="2" name="Title 1">
+            <a:extLst>
+              <a:ext uri="{FF2B5EF4-FFF2-40B4-BE49-F238E27FC236}">
                 <a16:creationId xmlns:a16="http://schemas.microsoft.com/office/drawing/2014/main" id="{B758140B-DA3C-4E1C-86A8-59DD2BA8B7C7}"/>
               </a:ext>
             </a:extLst>
@@ -4255,7 +4420,7 @@
 </p:sld>
 </file>
 
-<file path=ppt/slides/slide12.xml><?xml version="1.0" encoding="utf-8"?>
+<file path=ppt/slides/slide13.xml><?xml version="1.0" encoding="utf-8"?>
 <p:sld xmlns:a="http://schemas.openxmlformats.org/drawingml/2006/main" xmlns:r="http://schemas.openxmlformats.org/officeDocument/2006/relationships" xmlns:p="http://schemas.openxmlformats.org/presentationml/2006/main">
   <p:cSld>
     <p:spTree>
@@ -4743,10 +4908,10 @@
       </p:grpSpPr>
       <p:sp>
         <p:nvSpPr>
-          <p:cNvPr id="2" name="Title 1">
+          <p:cNvPr id="2" name="Tytuł 1">
             <a:extLst>
               <a:ext uri="{FF2B5EF4-FFF2-40B4-BE49-F238E27FC236}">
-                <a16:creationId xmlns:a16="http://schemas.microsoft.com/office/drawing/2014/main" id="{5385545E-93B3-4401-A97C-0AFE614D2551}"/>
+                <a16:creationId xmlns:a16="http://schemas.microsoft.com/office/drawing/2014/main" id="{AB61AC77-7C0E-B34D-B4AA-9DF07A2EB298}"/>
               </a:ext>
             </a:extLst>
           </p:cNvPr>
@@ -4762,20 +4927,16 @@
           <a:bodyPr/>
           <a:lstStyle/>
           <a:p>
-            <a:r>
-              <a:rPr lang="en-ZW" dirty="0"/>
-              <a:t>Speed of top 10 over the years</a:t>
-            </a:r>
-            <a:endParaRPr lang="en-US" dirty="0"/>
-          </a:p>
-        </p:txBody>
-      </p:sp>
-      <p:sp>
-        <p:nvSpPr>
-          <p:cNvPr id="3" name="Content Placeholder 2">
+            <a:endParaRPr lang="pl-PL"/>
+          </a:p>
+        </p:txBody>
+      </p:sp>
+      <p:sp>
+        <p:nvSpPr>
+          <p:cNvPr id="3" name="Symbol zastępczy zawartości 2">
             <a:extLst>
               <a:ext uri="{FF2B5EF4-FFF2-40B4-BE49-F238E27FC236}">
-                <a16:creationId xmlns:a16="http://schemas.microsoft.com/office/drawing/2014/main" id="{FA41D7D3-6AB0-4AD8-AA68-3A740B3C9E19}"/>
+                <a16:creationId xmlns:a16="http://schemas.microsoft.com/office/drawing/2014/main" id="{0DB222B3-2E1B-6D4E-ACFA-5B12A0C41B69}"/>
               </a:ext>
             </a:extLst>
           </p:cNvPr>
@@ -4791,14 +4952,50 @@
           <a:bodyPr/>
           <a:lstStyle/>
           <a:p>
-            <a:endParaRPr lang="en-US"/>
-          </a:p>
-        </p:txBody>
-      </p:sp>
+            <a:endParaRPr lang="pl-PL"/>
+          </a:p>
+        </p:txBody>
+      </p:sp>
+      <p:pic>
+        <p:nvPicPr>
+          <p:cNvPr id="5" name="Obraz 4">
+            <a:extLst>
+              <a:ext uri="{FF2B5EF4-FFF2-40B4-BE49-F238E27FC236}">
+                <a16:creationId xmlns:a16="http://schemas.microsoft.com/office/drawing/2014/main" id="{1053154A-A539-0649-A7E4-7EB29A7DD327}"/>
+              </a:ext>
+            </a:extLst>
+          </p:cNvPr>
+          <p:cNvPicPr>
+            <a:picLocks noChangeAspect="1"/>
+          </p:cNvPicPr>
+          <p:nvPr/>
+        </p:nvPicPr>
+        <p:blipFill>
+          <a:blip r:embed="rId3">
+            <a:extLst>
+              <a:ext uri="{28A0092B-C50C-407E-A947-70E740481C1C}">
+                <a14:useLocalDpi xmlns:a14="http://schemas.microsoft.com/office/drawing/2010/main" val="0"/>
+              </a:ext>
+            </a:extLst>
+          </a:blip>
+          <a:stretch>
+            <a:fillRect/>
+          </a:stretch>
+        </p:blipFill>
+        <p:spPr>
+          <a:xfrm>
+            <a:off x="687092" y="148845"/>
+            <a:ext cx="10817816" cy="6560309"/>
+          </a:xfrm>
+          <a:prstGeom prst="rect">
+            <a:avLst/>
+          </a:prstGeom>
+        </p:spPr>
+      </p:pic>
     </p:spTree>
     <p:extLst>
       <p:ext uri="{BB962C8B-B14F-4D97-AF65-F5344CB8AC3E}">
-        <p14:creationId xmlns:p14="http://schemas.microsoft.com/office/powerpoint/2010/main" val="1763201549"/>
+        <p14:creationId xmlns:p14="http://schemas.microsoft.com/office/powerpoint/2010/main" val="1507814769"/>
       </p:ext>
     </p:extLst>
   </p:cSld>
@@ -4827,10 +5024,10 @@
       </p:grpSpPr>
       <p:sp>
         <p:nvSpPr>
-          <p:cNvPr id="2" name="Tytuł 1">
+          <p:cNvPr id="2" name="Title 1">
             <a:extLst>
               <a:ext uri="{FF2B5EF4-FFF2-40B4-BE49-F238E27FC236}">
-                <a16:creationId xmlns:a16="http://schemas.microsoft.com/office/drawing/2014/main" id="{E39ADD3F-8B20-4D46-890F-ABDA09A98334}"/>
+                <a16:creationId xmlns:a16="http://schemas.microsoft.com/office/drawing/2014/main" id="{5385545E-93B3-4401-A97C-0AFE614D2551}"/>
               </a:ext>
             </a:extLst>
           </p:cNvPr>
@@ -4843,34 +5040,23 @@
         </p:nvSpPr>
         <p:spPr/>
         <p:txBody>
-          <a:bodyPr>
-            <a:normAutofit fontScale="90000"/>
-          </a:bodyPr>
-          <a:lstStyle/>
-          <a:p>
-            <a:r>
-              <a:rPr lang="en-US" b="0" i="0" dirty="0">
-                <a:solidFill>
-                  <a:srgbClr val="222222"/>
-                </a:solidFill>
-                <a:effectLst/>
-                <a:latin typeface="Arial" panose="020B0604020202020204" pitchFamily="34" charset="0"/>
-              </a:rPr>
-              <a:t>Difference in the cars decrease over the years?</a:t>
-            </a:r>
-            <a:br>
-              <a:rPr lang="en-US" dirty="0"/>
-            </a:br>
-            <a:endParaRPr lang="pl-PL" dirty="0"/>
-          </a:p>
-        </p:txBody>
-      </p:sp>
-      <p:sp>
-        <p:nvSpPr>
-          <p:cNvPr id="3" name="Symbol zastępczy zawartości 2">
+          <a:bodyPr/>
+          <a:lstStyle/>
+          <a:p>
+            <a:r>
+              <a:rPr lang="en-ZW" dirty="0"/>
+              <a:t>Speed of top 10 over the years</a:t>
+            </a:r>
+            <a:endParaRPr lang="en-US" dirty="0"/>
+          </a:p>
+        </p:txBody>
+      </p:sp>
+      <p:sp>
+        <p:nvSpPr>
+          <p:cNvPr id="3" name="Content Placeholder 2">
             <a:extLst>
               <a:ext uri="{FF2B5EF4-FFF2-40B4-BE49-F238E27FC236}">
-                <a16:creationId xmlns:a16="http://schemas.microsoft.com/office/drawing/2014/main" id="{4803CACD-3C69-DB4D-9CEB-DD715DEBBD68}"/>
+                <a16:creationId xmlns:a16="http://schemas.microsoft.com/office/drawing/2014/main" id="{FA41D7D3-6AB0-4AD8-AA68-3A740B3C9E19}"/>
               </a:ext>
             </a:extLst>
           </p:cNvPr>
@@ -4886,14 +5072,14 @@
           <a:bodyPr/>
           <a:lstStyle/>
           <a:p>
-            <a:endParaRPr lang="pl-PL"/>
+            <a:endParaRPr lang="en-US"/>
           </a:p>
         </p:txBody>
       </p:sp>
     </p:spTree>
     <p:extLst>
       <p:ext uri="{BB962C8B-B14F-4D97-AF65-F5344CB8AC3E}">
-        <p14:creationId xmlns:p14="http://schemas.microsoft.com/office/powerpoint/2010/main" val="2834576460"/>
+        <p14:creationId xmlns:p14="http://schemas.microsoft.com/office/powerpoint/2010/main" val="1763201549"/>
       </p:ext>
     </p:extLst>
   </p:cSld>
@@ -4938,9 +5124,21 @@
         </p:nvSpPr>
         <p:spPr/>
         <p:txBody>
-          <a:bodyPr/>
-          <a:lstStyle/>
-          <a:p>
+          <a:bodyPr>
+            <a:normAutofit fontScale="90000"/>
+          </a:bodyPr>
+          <a:lstStyle/>
+          <a:p>
+            <a:r>
+              <a:rPr lang="en-US" b="0" i="0" dirty="0">
+                <a:solidFill>
+                  <a:srgbClr val="222222"/>
+                </a:solidFill>
+                <a:effectLst/>
+                <a:latin typeface="Arial" panose="020B0604020202020204" pitchFamily="34" charset="0"/>
+              </a:rPr>
+              <a:t>Difference in the cars decrease over the years?</a:t>
+            </a:r>
             <a:br>
               <a:rPr lang="en-US" dirty="0"/>
             </a:br>
@@ -4976,7 +5174,7 @@
     </p:spTree>
     <p:extLst>
       <p:ext uri="{BB962C8B-B14F-4D97-AF65-F5344CB8AC3E}">
-        <p14:creationId xmlns:p14="http://schemas.microsoft.com/office/powerpoint/2010/main" val="4076154281"/>
+        <p14:creationId xmlns:p14="http://schemas.microsoft.com/office/powerpoint/2010/main" val="2834576460"/>
       </p:ext>
     </p:extLst>
   </p:cSld>
@@ -5005,10 +5203,10 @@
       </p:grpSpPr>
       <p:sp>
         <p:nvSpPr>
-          <p:cNvPr id="2" name="Title 1">
+          <p:cNvPr id="2" name="Tytuł 1">
             <a:extLst>
               <a:ext uri="{FF2B5EF4-FFF2-40B4-BE49-F238E27FC236}">
-                <a16:creationId xmlns:a16="http://schemas.microsoft.com/office/drawing/2014/main" id="{8F694C84-9122-407A-9335-7FF043C3E2A2}"/>
+                <a16:creationId xmlns:a16="http://schemas.microsoft.com/office/drawing/2014/main" id="{E39ADD3F-8B20-4D46-890F-ABDA09A98334}"/>
               </a:ext>
             </a:extLst>
           </p:cNvPr>
@@ -5024,16 +5222,19 @@
           <a:bodyPr/>
           <a:lstStyle/>
           <a:p>
-            <a:endParaRPr lang="en-US"/>
-          </a:p>
-        </p:txBody>
-      </p:sp>
-      <p:sp>
-        <p:nvSpPr>
-          <p:cNvPr id="3" name="Content Placeholder 2">
+            <a:br>
+              <a:rPr lang="en-US" dirty="0"/>
+            </a:br>
+            <a:endParaRPr lang="pl-PL" dirty="0"/>
+          </a:p>
+        </p:txBody>
+      </p:sp>
+      <p:sp>
+        <p:nvSpPr>
+          <p:cNvPr id="3" name="Symbol zastępczy zawartości 2">
             <a:extLst>
               <a:ext uri="{FF2B5EF4-FFF2-40B4-BE49-F238E27FC236}">
-                <a16:creationId xmlns:a16="http://schemas.microsoft.com/office/drawing/2014/main" id="{3367C7C9-20B6-4F7A-BF6E-D7967B105B94}"/>
+                <a16:creationId xmlns:a16="http://schemas.microsoft.com/office/drawing/2014/main" id="{4803CACD-3C69-DB4D-9CEB-DD715DEBBD68}"/>
               </a:ext>
             </a:extLst>
           </p:cNvPr>
@@ -5049,14 +5250,14 @@
           <a:bodyPr/>
           <a:lstStyle/>
           <a:p>
-            <a:endParaRPr lang="en-US"/>
+            <a:endParaRPr lang="pl-PL"/>
           </a:p>
         </p:txBody>
       </p:sp>
     </p:spTree>
     <p:extLst>
       <p:ext uri="{BB962C8B-B14F-4D97-AF65-F5344CB8AC3E}">
-        <p14:creationId xmlns:p14="http://schemas.microsoft.com/office/powerpoint/2010/main" val="4132244438"/>
+        <p14:creationId xmlns:p14="http://schemas.microsoft.com/office/powerpoint/2010/main" val="4076154281"/>
       </p:ext>
     </p:extLst>
   </p:cSld>

</xml_diff>

<commit_message>
slide with gained points updated with plot and description
</commit_message>
<xml_diff>
--- a/Presentation/F1_Presentation_Moyo_Majak.pptx
+++ b/Presentation/F1_Presentation_Moyo_Majak.pptx
@@ -209,7 +209,7 @@
           <a:p>
             <a:fld id="{B3CDF40C-5A9A-4B37-9F4E-A337933060DF}" type="datetimeFigureOut">
               <a:rPr lang="en-US" smtClean="0"/>
-              <a:t>1/20/21</a:t>
+              <a:t>1/21/21</a:t>
             </a:fld>
             <a:endParaRPr lang="en-US"/>
           </a:p>
@@ -1398,7 +1398,19 @@
           <a:p>
             <a:r>
               <a:rPr lang="en-ZW" dirty="0"/>
-              <a:t>This plot shows a </a:t>
+              <a:t>This plot shows a percent of points gained during the race (in comparison to qualify) as number of gained points divided by number of total possible points to gain from 1st to 10</a:t>
+            </a:r>
+            <a:r>
+              <a:rPr lang="en-ZW" baseline="30000" dirty="0"/>
+              <a:t>th</a:t>
+            </a:r>
+            <a:r>
+              <a:rPr lang="en-ZW" dirty="0"/>
+              <a:t> position, which is 101 points. In fact, the point system has been changed over years, but we use the current system to be able to compare every single year from </a:t>
+            </a:r>
+            <a:r>
+              <a:rPr lang="en-ZW"/>
+              <a:t>the history.</a:t>
             </a:r>
             <a:endParaRPr lang="en-US" dirty="0"/>
           </a:p>
@@ -1595,7 +1607,7 @@
           <a:p>
             <a:fld id="{276D79ED-3FA7-4EF8-964B-EB8BCFAB02F8}" type="datetimeFigureOut">
               <a:rPr lang="en-US" smtClean="0"/>
-              <a:t>1/20/21</a:t>
+              <a:t>1/21/21</a:t>
             </a:fld>
             <a:endParaRPr lang="en-US"/>
           </a:p>
@@ -1765,7 +1777,7 @@
           <a:p>
             <a:fld id="{276D79ED-3FA7-4EF8-964B-EB8BCFAB02F8}" type="datetimeFigureOut">
               <a:rPr lang="en-US" smtClean="0"/>
-              <a:t>1/20/21</a:t>
+              <a:t>1/21/21</a:t>
             </a:fld>
             <a:endParaRPr lang="en-US"/>
           </a:p>
@@ -2011,7 +2023,7 @@
           <a:p>
             <a:fld id="{276D79ED-3FA7-4EF8-964B-EB8BCFAB02F8}" type="datetimeFigureOut">
               <a:rPr lang="en-US" smtClean="0"/>
-              <a:t>1/20/21</a:t>
+              <a:t>1/21/21</a:t>
             </a:fld>
             <a:endParaRPr lang="en-US"/>
           </a:p>
@@ -2243,7 +2255,7 @@
           <a:p>
             <a:fld id="{276D79ED-3FA7-4EF8-964B-EB8BCFAB02F8}" type="datetimeFigureOut">
               <a:rPr lang="en-US" smtClean="0"/>
-              <a:t>1/20/21</a:t>
+              <a:t>1/21/21</a:t>
             </a:fld>
             <a:endParaRPr lang="en-US"/>
           </a:p>
@@ -2610,7 +2622,7 @@
           <a:p>
             <a:fld id="{276D79ED-3FA7-4EF8-964B-EB8BCFAB02F8}" type="datetimeFigureOut">
               <a:rPr lang="en-US" smtClean="0"/>
-              <a:t>1/20/21</a:t>
+              <a:t>1/21/21</a:t>
             </a:fld>
             <a:endParaRPr lang="en-US"/>
           </a:p>
@@ -2728,7 +2740,7 @@
           <a:p>
             <a:fld id="{276D79ED-3FA7-4EF8-964B-EB8BCFAB02F8}" type="datetimeFigureOut">
               <a:rPr lang="en-US" smtClean="0"/>
-              <a:t>1/20/21</a:t>
+              <a:t>1/21/21</a:t>
             </a:fld>
             <a:endParaRPr lang="en-US"/>
           </a:p>
@@ -2823,7 +2835,7 @@
           <a:p>
             <a:fld id="{276D79ED-3FA7-4EF8-964B-EB8BCFAB02F8}" type="datetimeFigureOut">
               <a:rPr lang="en-US" smtClean="0"/>
-              <a:t>1/20/21</a:t>
+              <a:t>1/21/21</a:t>
             </a:fld>
             <a:endParaRPr lang="en-US"/>
           </a:p>
@@ -3100,7 +3112,7 @@
           <a:p>
             <a:fld id="{276D79ED-3FA7-4EF8-964B-EB8BCFAB02F8}" type="datetimeFigureOut">
               <a:rPr lang="en-US" smtClean="0"/>
-              <a:t>1/20/21</a:t>
+              <a:t>1/21/21</a:t>
             </a:fld>
             <a:endParaRPr lang="en-US"/>
           </a:p>
@@ -3357,7 +3369,7 @@
           <a:p>
             <a:fld id="{276D79ED-3FA7-4EF8-964B-EB8BCFAB02F8}" type="datetimeFigureOut">
               <a:rPr lang="en-US" smtClean="0"/>
-              <a:t>1/20/21</a:t>
+              <a:t>1/21/21</a:t>
             </a:fld>
             <a:endParaRPr lang="en-US"/>
           </a:p>
@@ -3578,7 +3590,7 @@
             <a:fld id="{276D79ED-3FA7-4EF8-964B-EB8BCFAB02F8}" type="datetimeFigureOut">
               <a:rPr lang="en-US" smtClean="0"/>
               <a:pPr/>
-              <a:t>1/20/21</a:t>
+              <a:t>1/21/21</a:t>
             </a:fld>
             <a:endParaRPr lang="en-US"/>
           </a:p>
@@ -5229,31 +5241,41 @@
           </a:p>
         </p:txBody>
       </p:sp>
-      <p:sp>
-        <p:nvSpPr>
-          <p:cNvPr id="3" name="Symbol zastępczy zawartości 2">
+      <p:pic>
+        <p:nvPicPr>
+          <p:cNvPr id="13" name="Symbol zastępczy zawartości 12">
             <a:extLst>
               <a:ext uri="{FF2B5EF4-FFF2-40B4-BE49-F238E27FC236}">
-                <a16:creationId xmlns:a16="http://schemas.microsoft.com/office/drawing/2014/main" id="{4803CACD-3C69-DB4D-9CEB-DD715DEBBD68}"/>
+                <a16:creationId xmlns:a16="http://schemas.microsoft.com/office/drawing/2014/main" id="{48D33886-FB38-1C49-9541-8BFDB7BFA42F}"/>
               </a:ext>
             </a:extLst>
           </p:cNvPr>
-          <p:cNvSpPr>
-            <a:spLocks noGrp="1"/>
-          </p:cNvSpPr>
+          <p:cNvPicPr>
+            <a:picLocks noGrp="1" noChangeAspect="1"/>
+          </p:cNvPicPr>
           <p:nvPr>
             <p:ph idx="1"/>
           </p:nvPr>
-        </p:nvSpPr>
-        <p:spPr/>
-        <p:txBody>
-          <a:bodyPr/>
-          <a:lstStyle/>
-          <a:p>
-            <a:endParaRPr lang="pl-PL"/>
-          </a:p>
-        </p:txBody>
-      </p:sp>
+        </p:nvPicPr>
+        <p:blipFill>
+          <a:blip r:embed="rId3">
+            <a:extLst>
+              <a:ext uri="{28A0092B-C50C-407E-A947-70E740481C1C}">
+                <a14:useLocalDpi xmlns:a14="http://schemas.microsoft.com/office/drawing/2010/main" val="0"/>
+              </a:ext>
+            </a:extLst>
+          </a:blip>
+          <a:stretch>
+            <a:fillRect/>
+          </a:stretch>
+        </p:blipFill>
+        <p:spPr>
+          <a:xfrm>
+            <a:off x="55727" y="949973"/>
+            <a:ext cx="12136273" cy="5542902"/>
+          </a:xfrm>
+        </p:spPr>
+      </p:pic>
     </p:spTree>
     <p:extLst>
       <p:ext uri="{BB962C8B-B14F-4D97-AF65-F5344CB8AC3E}">

</xml_diff>

<commit_message>
whole presentation updated - only one plot to do and will be done
</commit_message>
<xml_diff>
--- a/Presentation/F1_Presentation_Moyo_Majak.pptx
+++ b/Presentation/F1_Presentation_Moyo_Majak.pptx
@@ -5,22 +5,20 @@
     <p:sldMasterId id="2147483648" r:id="rId1"/>
   </p:sldMasterIdLst>
   <p:notesMasterIdLst>
-    <p:notesMasterId r:id="rId15"/>
+    <p:notesMasterId r:id="rId13"/>
   </p:notesMasterIdLst>
   <p:sldIdLst>
     <p:sldId id="256" r:id="rId2"/>
-    <p:sldId id="257" r:id="rId3"/>
-    <p:sldId id="258" r:id="rId4"/>
-    <p:sldId id="260" r:id="rId5"/>
-    <p:sldId id="259" r:id="rId6"/>
-    <p:sldId id="268" r:id="rId7"/>
-    <p:sldId id="264" r:id="rId8"/>
-    <p:sldId id="262" r:id="rId9"/>
+    <p:sldId id="258" r:id="rId3"/>
+    <p:sldId id="269" r:id="rId4"/>
+    <p:sldId id="257" r:id="rId5"/>
+    <p:sldId id="260" r:id="rId6"/>
+    <p:sldId id="259" r:id="rId7"/>
+    <p:sldId id="268" r:id="rId8"/>
+    <p:sldId id="271" r:id="rId9"/>
     <p:sldId id="261" r:id="rId10"/>
-    <p:sldId id="265" r:id="rId11"/>
-    <p:sldId id="263" r:id="rId12"/>
-    <p:sldId id="266" r:id="rId13"/>
-    <p:sldId id="267" r:id="rId14"/>
+    <p:sldId id="263" r:id="rId11"/>
+    <p:sldId id="270" r:id="rId12"/>
   </p:sldIdLst>
   <p:sldSz cx="12192000" cy="6858000"/>
   <p:notesSz cx="6858000" cy="9144000"/>
@@ -209,7 +207,7 @@
           <a:p>
             <a:fld id="{B3CDF40C-5A9A-4B37-9F4E-A337933060DF}" type="datetimeFigureOut">
               <a:rPr lang="en-US" smtClean="0"/>
-              <a:t>1/21/21</a:t>
+              <a:t>1/22/21</a:t>
             </a:fld>
             <a:endParaRPr lang="en-US"/>
           </a:p>
@@ -520,117 +518,154 @@
           <a:bodyPr/>
           <a:lstStyle/>
           <a:p>
-            <a:pPr marL="0" marR="0" lvl="0" indent="0" algn="l" defTabSz="914400" rtl="0" eaLnBrk="1" fontAlgn="auto" latinLnBrk="0" hangingPunct="1">
-              <a:lnSpc>
-                <a:spcPct val="100000"/>
-              </a:lnSpc>
-              <a:spcBef>
-                <a:spcPts val="0"/>
-              </a:spcBef>
-              <a:spcAft>
-                <a:spcPts val="0"/>
-              </a:spcAft>
-              <a:buClrTx/>
-              <a:buSzTx/>
-              <a:buFontTx/>
-              <a:buNone/>
-              <a:tabLst/>
-              <a:defRPr/>
-            </a:pPr>
-            <a:r>
-              <a:rPr lang="en-US" b="1" i="0" dirty="0">
-                <a:solidFill>
-                  <a:srgbClr val="202124"/>
-                </a:solidFill>
+            <a:r>
+              <a:rPr lang="en-US" dirty="0">
                 <a:effectLst/>
-                <a:latin typeface="arial" panose="020B0604020202020204" pitchFamily="34" charset="0"/>
+                <a:latin typeface="SFMono-Regular"/>
               </a:rPr>
-              <a:t>Formula 1 is known world over and is not only popular for motorsport lovers but all other people too. It</a:t>
-            </a:r>
-            <a:r>
-              <a:rPr lang="en-US" b="0" i="0" dirty="0">
-                <a:solidFill>
-                  <a:srgbClr val="202124"/>
-                </a:solidFill>
+              <a:t>The dataset used in this project consists of information about F1 races statistics from 1950 until the latest 2020 season. </a:t>
+            </a:r>
+          </a:p>
+          <a:p>
+            <a:r>
+              <a:rPr lang="en-US" dirty="0">
                 <a:effectLst/>
-                <a:latin typeface="arial" panose="020B0604020202020204" pitchFamily="34" charset="0"/>
+                <a:latin typeface="SFMono-Regular"/>
               </a:rPr>
-              <a:t> is a massive research and development powerhouse. Some research has shown that technologies developed within F1 team factories find their way into other industries, making human lives simpler, safer and more efficient.</a:t>
-            </a:r>
-          </a:p>
-          <a:p>
-            <a:pPr marL="0" marR="0" lvl="0" indent="0" algn="l" defTabSz="914400" rtl="0" eaLnBrk="1" fontAlgn="auto" latinLnBrk="0" hangingPunct="1">
-              <a:lnSpc>
-                <a:spcPct val="100000"/>
-              </a:lnSpc>
-              <a:spcBef>
-                <a:spcPts val="0"/>
-              </a:spcBef>
-              <a:spcAft>
-                <a:spcPts val="0"/>
-              </a:spcAft>
-              <a:buClrTx/>
-              <a:buSzTx/>
-              <a:buFontTx/>
-              <a:buNone/>
-              <a:tabLst/>
-              <a:defRPr/>
-            </a:pPr>
-            <a:endParaRPr lang="en-US" b="0" i="0" dirty="0">
-              <a:solidFill>
-                <a:srgbClr val="202124"/>
-              </a:solidFill>
+              <a:t>It was shared by </a:t>
+            </a:r>
+            <a:r>
+              <a:rPr lang="en-US" dirty="0" err="1">
+                <a:effectLst/>
+                <a:latin typeface="SFMono-Regular"/>
+              </a:rPr>
+              <a:t>Vopani</a:t>
+            </a:r>
+            <a:r>
+              <a:rPr lang="en-US" dirty="0">
+                <a:effectLst/>
+                <a:latin typeface="SFMono-Regular"/>
+              </a:rPr>
+              <a:t> on the Kaggle platform and consists of 13 csv files: </a:t>
+            </a:r>
+          </a:p>
+          <a:p>
+            <a:endParaRPr lang="en-US" dirty="0">
               <a:effectLst/>
-              <a:latin typeface="arial" panose="020B0604020202020204" pitchFamily="34" charset="0"/>
+              <a:latin typeface="SFMono-Regular"/>
             </a:endParaRPr>
           </a:p>
           <a:p>
-            <a:pPr marL="0" marR="0" lvl="0" indent="0" algn="l" defTabSz="914400" rtl="0" eaLnBrk="1" fontAlgn="auto" latinLnBrk="0" hangingPunct="1">
-              <a:lnSpc>
-                <a:spcPct val="100000"/>
-              </a:lnSpc>
-              <a:spcBef>
-                <a:spcPts val="0"/>
-              </a:spcBef>
-              <a:spcAft>
-                <a:spcPts val="0"/>
-              </a:spcAft>
-              <a:buClrTx/>
-              <a:buSzTx/>
-              <a:buFontTx/>
-              <a:buNone/>
-              <a:tabLst/>
-              <a:defRPr/>
-            </a:pPr>
-            <a:r>
-              <a:rPr lang="en-US" b="0" i="0" dirty="0">
-                <a:solidFill>
-                  <a:srgbClr val="202124"/>
-                </a:solidFill>
+            <a:r>
+              <a:rPr lang="en-US" dirty="0">
                 <a:effectLst/>
-                <a:latin typeface="arial" panose="020B0604020202020204" pitchFamily="34" charset="0"/>
+                <a:latin typeface="SFMono-Regular"/>
               </a:rPr>
-              <a:t>Over the past 70 years F1 has been done in 6 continents and this map of circuits shows a densely populated number of races being in Europe</a:t>
-            </a:r>
-          </a:p>
-          <a:p>
-            <a:pPr marL="0" marR="0" lvl="0" indent="0" algn="l" defTabSz="914400" rtl="0" eaLnBrk="1" fontAlgn="auto" latinLnBrk="0" hangingPunct="1">
-              <a:lnSpc>
-                <a:spcPct val="100000"/>
-              </a:lnSpc>
-              <a:spcBef>
-                <a:spcPts val="0"/>
-              </a:spcBef>
-              <a:spcAft>
-                <a:spcPts val="0"/>
-              </a:spcAft>
-              <a:buClrTx/>
-              <a:buSzTx/>
-              <a:buFontTx/>
-              <a:buNone/>
-              <a:tabLst/>
-              <a:defRPr/>
-            </a:pPr>
+              <a:t>* circuits* </a:t>
+            </a:r>
+            <a:r>
+              <a:rPr lang="en-US" dirty="0" err="1">
+                <a:effectLst/>
+                <a:latin typeface="SFMono-Regular"/>
+              </a:rPr>
+              <a:t>constructor_results</a:t>
+            </a:r>
+            <a:r>
+              <a:rPr lang="en-US" dirty="0">
+                <a:effectLst/>
+                <a:latin typeface="SFMono-Regular"/>
+              </a:rPr>
+              <a:t>* </a:t>
+            </a:r>
+            <a:r>
+              <a:rPr lang="en-US" dirty="0" err="1">
+                <a:effectLst/>
+                <a:latin typeface="SFMono-Regular"/>
+              </a:rPr>
+              <a:t>constructor_standings</a:t>
+            </a:r>
+            <a:r>
+              <a:rPr lang="en-US" dirty="0">
+                <a:effectLst/>
+                <a:latin typeface="SFMono-Regular"/>
+              </a:rPr>
+              <a:t>* constructors* </a:t>
+            </a:r>
+            <a:r>
+              <a:rPr lang="en-US" dirty="0" err="1">
+                <a:effectLst/>
+                <a:latin typeface="SFMono-Regular"/>
+              </a:rPr>
+              <a:t>driver_standings</a:t>
+            </a:r>
+            <a:r>
+              <a:rPr lang="en-US" dirty="0">
+                <a:effectLst/>
+                <a:latin typeface="SFMono-Regular"/>
+              </a:rPr>
+              <a:t>* drivers* </a:t>
+            </a:r>
+            <a:r>
+              <a:rPr lang="en-US" dirty="0" err="1">
+                <a:effectLst/>
+                <a:latin typeface="SFMono-Regular"/>
+              </a:rPr>
+              <a:t>lap_times</a:t>
+            </a:r>
+            <a:r>
+              <a:rPr lang="en-US" dirty="0">
+                <a:effectLst/>
+                <a:latin typeface="SFMono-Regular"/>
+              </a:rPr>
+              <a:t>* </a:t>
+            </a:r>
+            <a:r>
+              <a:rPr lang="en-US" dirty="0" err="1">
+                <a:effectLst/>
+                <a:latin typeface="SFMono-Regular"/>
+              </a:rPr>
+              <a:t>pit_stops</a:t>
+            </a:r>
+            <a:r>
+              <a:rPr lang="en-US" dirty="0">
+                <a:effectLst/>
+                <a:latin typeface="SFMono-Regular"/>
+              </a:rPr>
+              <a:t>* qualifying* races* results* seasons* status</a:t>
+            </a:r>
+          </a:p>
+          <a:p>
+            <a:endParaRPr lang="en-US" dirty="0">
+              <a:effectLst/>
+              <a:latin typeface="SFMono-Regular"/>
+            </a:endParaRPr>
+          </a:p>
+          <a:p>
+            <a:r>
+              <a:rPr lang="en-US" dirty="0">
+                <a:effectLst/>
+                <a:latin typeface="SFMono-Regular"/>
+              </a:rPr>
+              <a:t>It is a real challenge to compare drivers, cars and teams, considering very complex structure of the cars and the numerous changing factors on the track.</a:t>
+            </a:r>
+          </a:p>
+          <a:p>
+            <a:endParaRPr lang="en-US" dirty="0">
+              <a:effectLst/>
+              <a:latin typeface="SFMono-Regular"/>
+            </a:endParaRPr>
+          </a:p>
+          <a:p>
+            <a:r>
+              <a:rPr lang="en-US" dirty="0">
+                <a:effectLst/>
+                <a:latin typeface="SFMono-Regular"/>
+              </a:rPr>
+              <a:t>In this project we wish to answer a few interesting questions using some R visualization techniques </a:t>
+            </a:r>
+            <a:br>
+              <a:rPr lang="en-US" dirty="0"/>
+            </a:br>
             <a:endParaRPr lang="en-US" dirty="0"/>
           </a:p>
           <a:p>
@@ -664,7 +699,7 @@
     </p:spTree>
     <p:extLst>
       <p:ext uri="{BB962C8B-B14F-4D97-AF65-F5344CB8AC3E}">
-        <p14:creationId xmlns:p14="http://schemas.microsoft.com/office/powerpoint/2010/main" val="2558565497"/>
+        <p14:creationId xmlns:p14="http://schemas.microsoft.com/office/powerpoint/2010/main" val="3824148919"/>
       </p:ext>
     </p:extLst>
   </p:cSld>
@@ -899,7 +934,7 @@
     </p:spTree>
     <p:extLst>
       <p:ext uri="{BB962C8B-B14F-4D97-AF65-F5344CB8AC3E}">
-        <p14:creationId xmlns:p14="http://schemas.microsoft.com/office/powerpoint/2010/main" val="3824148919"/>
+        <p14:creationId xmlns:p14="http://schemas.microsoft.com/office/powerpoint/2010/main" val="1963957949"/>
       </p:ext>
     </p:extLst>
   </p:cSld>
@@ -953,10 +988,120 @@
           <a:bodyPr/>
           <a:lstStyle/>
           <a:p>
-            <a:r>
-              <a:rPr lang="en-ZW" dirty="0"/>
-              <a:t>This question will be evaluated using the following two slides </a:t>
-            </a:r>
+            <a:pPr marL="0" marR="0" lvl="0" indent="0" algn="l" defTabSz="914400" rtl="0" eaLnBrk="1" fontAlgn="auto" latinLnBrk="0" hangingPunct="1">
+              <a:lnSpc>
+                <a:spcPct val="100000"/>
+              </a:lnSpc>
+              <a:spcBef>
+                <a:spcPts val="0"/>
+              </a:spcBef>
+              <a:spcAft>
+                <a:spcPts val="0"/>
+              </a:spcAft>
+              <a:buClrTx/>
+              <a:buSzTx/>
+              <a:buFontTx/>
+              <a:buNone/>
+              <a:tabLst/>
+              <a:defRPr/>
+            </a:pPr>
+            <a:r>
+              <a:rPr lang="en-US" b="1" i="0" dirty="0">
+                <a:solidFill>
+                  <a:srgbClr val="202124"/>
+                </a:solidFill>
+                <a:effectLst/>
+                <a:latin typeface="arial" panose="020B0604020202020204" pitchFamily="34" charset="0"/>
+              </a:rPr>
+              <a:t>Formula 1 is known world over and is not only popular for motorsport lovers but all other people too. It</a:t>
+            </a:r>
+            <a:r>
+              <a:rPr lang="en-US" b="0" i="0" dirty="0">
+                <a:solidFill>
+                  <a:srgbClr val="202124"/>
+                </a:solidFill>
+                <a:effectLst/>
+                <a:latin typeface="arial" panose="020B0604020202020204" pitchFamily="34" charset="0"/>
+              </a:rPr>
+              <a:t> is a massive research and development powerhouse. Some research has shown that technologies developed within F1 team factories find their way into other industries, making human lives simpler, safer and more efficient.</a:t>
+            </a:r>
+          </a:p>
+          <a:p>
+            <a:pPr marL="0" marR="0" lvl="0" indent="0" algn="l" defTabSz="914400" rtl="0" eaLnBrk="1" fontAlgn="auto" latinLnBrk="0" hangingPunct="1">
+              <a:lnSpc>
+                <a:spcPct val="100000"/>
+              </a:lnSpc>
+              <a:spcBef>
+                <a:spcPts val="0"/>
+              </a:spcBef>
+              <a:spcAft>
+                <a:spcPts val="0"/>
+              </a:spcAft>
+              <a:buClrTx/>
+              <a:buSzTx/>
+              <a:buFontTx/>
+              <a:buNone/>
+              <a:tabLst/>
+              <a:defRPr/>
+            </a:pPr>
+            <a:endParaRPr lang="en-US" b="0" i="0" dirty="0">
+              <a:solidFill>
+                <a:srgbClr val="202124"/>
+              </a:solidFill>
+              <a:effectLst/>
+              <a:latin typeface="arial" panose="020B0604020202020204" pitchFamily="34" charset="0"/>
+            </a:endParaRPr>
+          </a:p>
+          <a:p>
+            <a:pPr marL="0" marR="0" lvl="0" indent="0" algn="l" defTabSz="914400" rtl="0" eaLnBrk="1" fontAlgn="auto" latinLnBrk="0" hangingPunct="1">
+              <a:lnSpc>
+                <a:spcPct val="100000"/>
+              </a:lnSpc>
+              <a:spcBef>
+                <a:spcPts val="0"/>
+              </a:spcBef>
+              <a:spcAft>
+                <a:spcPts val="0"/>
+              </a:spcAft>
+              <a:buClrTx/>
+              <a:buSzTx/>
+              <a:buFontTx/>
+              <a:buNone/>
+              <a:tabLst/>
+              <a:defRPr/>
+            </a:pPr>
+            <a:r>
+              <a:rPr lang="en-US" b="0" i="0" dirty="0">
+                <a:solidFill>
+                  <a:srgbClr val="202124"/>
+                </a:solidFill>
+                <a:effectLst/>
+                <a:latin typeface="arial" panose="020B0604020202020204" pitchFamily="34" charset="0"/>
+              </a:rPr>
+              <a:t>Over the past 70 years F1 has been done in 6 continents and this map of circuits shows a densely populated number of races being in Europe</a:t>
+            </a:r>
+          </a:p>
+          <a:p>
+            <a:pPr marL="0" marR="0" lvl="0" indent="0" algn="l" defTabSz="914400" rtl="0" eaLnBrk="1" fontAlgn="auto" latinLnBrk="0" hangingPunct="1">
+              <a:lnSpc>
+                <a:spcPct val="100000"/>
+              </a:lnSpc>
+              <a:spcBef>
+                <a:spcPts val="0"/>
+              </a:spcBef>
+              <a:spcAft>
+                <a:spcPts val="0"/>
+              </a:spcAft>
+              <a:buClrTx/>
+              <a:buSzTx/>
+              <a:buFontTx/>
+              <a:buNone/>
+              <a:tabLst/>
+              <a:defRPr/>
+            </a:pPr>
+            <a:endParaRPr lang="en-US" dirty="0"/>
+          </a:p>
+          <a:p>
             <a:endParaRPr lang="en-US" dirty="0"/>
           </a:p>
         </p:txBody>
@@ -987,7 +1132,7 @@
     </p:spTree>
     <p:extLst>
       <p:ext uri="{BB962C8B-B14F-4D97-AF65-F5344CB8AC3E}">
-        <p14:creationId xmlns:p14="http://schemas.microsoft.com/office/powerpoint/2010/main" val="952584712"/>
+        <p14:creationId xmlns:p14="http://schemas.microsoft.com/office/powerpoint/2010/main" val="2558565497"/>
       </p:ext>
     </p:extLst>
   </p:cSld>
@@ -1043,73 +1188,8 @@
           <a:p>
             <a:r>
               <a:rPr lang="en-ZW" dirty="0"/>
-              <a:t>In each decade there are variations.</a:t>
-            </a:r>
-          </a:p>
-          <a:p>
-            <a:endParaRPr lang="en-ZW" dirty="0"/>
-          </a:p>
-          <a:p>
-            <a:r>
-              <a:rPr lang="en-ZW" dirty="0"/>
-              <a:t>This plot shows the </a:t>
-            </a:r>
-            <a:r>
-              <a:rPr lang="en-US" b="0" i="0" dirty="0">
-                <a:solidFill>
-                  <a:srgbClr val="050505"/>
-                </a:solidFill>
-                <a:effectLst/>
-                <a:latin typeface="Segoe UI Historic" panose="020B0502040204020203" pitchFamily="34" charset="0"/>
-              </a:rPr>
-              <a:t>accumulated sum of points for top 10 </a:t>
-            </a:r>
-            <a:r>
-              <a:rPr lang="en-US" b="0" i="0" dirty="0" err="1">
-                <a:solidFill>
-                  <a:srgbClr val="050505"/>
-                </a:solidFill>
-                <a:effectLst/>
-                <a:latin typeface="Segoe UI Historic" panose="020B0502040204020203" pitchFamily="34" charset="0"/>
-              </a:rPr>
-              <a:t>constractors</a:t>
-            </a:r>
-            <a:r>
-              <a:rPr lang="en-US" b="0" i="0" dirty="0">
-                <a:solidFill>
-                  <a:srgbClr val="050505"/>
-                </a:solidFill>
-                <a:effectLst/>
-                <a:latin typeface="Segoe UI Historic" panose="020B0502040204020203" pitchFamily="34" charset="0"/>
-              </a:rPr>
-              <a:t> over the years</a:t>
-            </a:r>
-          </a:p>
-          <a:p>
-            <a:r>
-              <a:rPr lang="en-US" b="0" i="0" dirty="0">
-                <a:solidFill>
-                  <a:srgbClr val="050505"/>
-                </a:solidFill>
-                <a:effectLst/>
-                <a:latin typeface="Segoe UI Historic" panose="020B0502040204020203" pitchFamily="34" charset="0"/>
-              </a:rPr>
-              <a:t>The accumulated number  for the Mercedes increased the fastest regardless of the Mercedes being introduced in later years.</a:t>
-            </a:r>
-          </a:p>
-          <a:p>
-            <a:r>
-              <a:rPr lang="en-US" b="0" i="0" dirty="0">
-                <a:solidFill>
-                  <a:srgbClr val="050505"/>
-                </a:solidFill>
-                <a:effectLst/>
-                <a:latin typeface="Segoe UI Historic" panose="020B0502040204020203" pitchFamily="34" charset="0"/>
-              </a:rPr>
-              <a:t>The Ferrari has the  highest number of accumulated points</a:t>
-            </a:r>
-          </a:p>
-          <a:p>
+              <a:t>This question will be evaluated using the following two slides </a:t>
+            </a:r>
             <a:endParaRPr lang="en-US" dirty="0"/>
           </a:p>
         </p:txBody>
@@ -1140,7 +1220,7 @@
     </p:spTree>
     <p:extLst>
       <p:ext uri="{BB962C8B-B14F-4D97-AF65-F5344CB8AC3E}">
-        <p14:creationId xmlns:p14="http://schemas.microsoft.com/office/powerpoint/2010/main" val="331220547"/>
+        <p14:creationId xmlns:p14="http://schemas.microsoft.com/office/powerpoint/2010/main" val="952584712"/>
       </p:ext>
     </p:extLst>
   </p:cSld>
@@ -1169,7 +1249,7 @@
       </p:grpSpPr>
       <p:sp>
         <p:nvSpPr>
-          <p:cNvPr id="2" name="Symbol zastępczy obrazu slajdu 1"/>
+          <p:cNvPr id="2" name="Slide Image Placeholder 1"/>
           <p:cNvSpPr>
             <a:spLocks noGrp="1" noRot="1" noChangeAspect="1"/>
           </p:cNvSpPr>
@@ -1181,7 +1261,7 @@
       </p:sp>
       <p:sp>
         <p:nvSpPr>
-          <p:cNvPr id="3" name="Symbol zastępczy notatek 2"/>
+          <p:cNvPr id="3" name="Notes Placeholder 2"/>
           <p:cNvSpPr>
             <a:spLocks noGrp="1"/>
           </p:cNvSpPr>
@@ -1194,13 +1274,82 @@
           <a:bodyPr/>
           <a:lstStyle/>
           <a:p>
-            <a:endParaRPr lang="pl-PL" dirty="0"/>
-          </a:p>
-        </p:txBody>
-      </p:sp>
-      <p:sp>
-        <p:nvSpPr>
-          <p:cNvPr id="4" name="Symbol zastępczy numeru slajdu 3"/>
+            <a:r>
+              <a:rPr lang="en-ZW" dirty="0"/>
+              <a:t>In each decade there are variations.</a:t>
+            </a:r>
+          </a:p>
+          <a:p>
+            <a:endParaRPr lang="en-ZW" dirty="0"/>
+          </a:p>
+          <a:p>
+            <a:r>
+              <a:rPr lang="en-ZW" dirty="0"/>
+              <a:t>This plot shows the </a:t>
+            </a:r>
+            <a:r>
+              <a:rPr lang="en-US" b="0" i="0" dirty="0">
+                <a:solidFill>
+                  <a:srgbClr val="050505"/>
+                </a:solidFill>
+                <a:effectLst/>
+                <a:latin typeface="Segoe UI Historic" panose="020B0502040204020203" pitchFamily="34" charset="0"/>
+              </a:rPr>
+              <a:t>accumulated sum of points for top 10 </a:t>
+            </a:r>
+            <a:r>
+              <a:rPr lang="en-US" b="0" i="0" dirty="0" err="1">
+                <a:solidFill>
+                  <a:srgbClr val="050505"/>
+                </a:solidFill>
+                <a:effectLst/>
+                <a:latin typeface="Segoe UI Historic" panose="020B0502040204020203" pitchFamily="34" charset="0"/>
+              </a:rPr>
+              <a:t>constractors</a:t>
+            </a:r>
+            <a:r>
+              <a:rPr lang="en-US" b="0" i="0" dirty="0">
+                <a:solidFill>
+                  <a:srgbClr val="050505"/>
+                </a:solidFill>
+                <a:effectLst/>
+                <a:latin typeface="Segoe UI Historic" panose="020B0502040204020203" pitchFamily="34" charset="0"/>
+              </a:rPr>
+              <a:t> over the years</a:t>
+            </a:r>
+          </a:p>
+          <a:p>
+            <a:r>
+              <a:rPr lang="en-US" b="0" i="0" dirty="0">
+                <a:solidFill>
+                  <a:srgbClr val="050505"/>
+                </a:solidFill>
+                <a:effectLst/>
+                <a:latin typeface="Segoe UI Historic" panose="020B0502040204020203" pitchFamily="34" charset="0"/>
+              </a:rPr>
+              <a:t>The accumulated number  for the Mercedes increased the fastest regardless of the Mercedes being introduced in later years.</a:t>
+            </a:r>
+          </a:p>
+          <a:p>
+            <a:r>
+              <a:rPr lang="en-US" b="0" i="0" dirty="0">
+                <a:solidFill>
+                  <a:srgbClr val="050505"/>
+                </a:solidFill>
+                <a:effectLst/>
+                <a:latin typeface="Segoe UI Historic" panose="020B0502040204020203" pitchFamily="34" charset="0"/>
+              </a:rPr>
+              <a:t>The Ferrari has the  highest number of accumulated points</a:t>
+            </a:r>
+          </a:p>
+          <a:p>
+            <a:endParaRPr lang="en-US" dirty="0"/>
+          </a:p>
+        </p:txBody>
+      </p:sp>
+      <p:sp>
+        <p:nvSpPr>
+          <p:cNvPr id="4" name="Slide Number Placeholder 3"/>
           <p:cNvSpPr>
             <a:spLocks noGrp="1"/>
           </p:cNvSpPr>
@@ -1224,7 +1373,7 @@
     </p:spTree>
     <p:extLst>
       <p:ext uri="{BB962C8B-B14F-4D97-AF65-F5344CB8AC3E}">
-        <p14:creationId xmlns:p14="http://schemas.microsoft.com/office/powerpoint/2010/main" val="4221663633"/>
+        <p14:creationId xmlns:p14="http://schemas.microsoft.com/office/powerpoint/2010/main" val="331220547"/>
       </p:ext>
     </p:extLst>
   </p:cSld>
@@ -1253,7 +1402,7 @@
       </p:grpSpPr>
       <p:sp>
         <p:nvSpPr>
-          <p:cNvPr id="2" name="Slide Image Placeholder 1"/>
+          <p:cNvPr id="2" name="Symbol zastępczy obrazu slajdu 1"/>
           <p:cNvSpPr>
             <a:spLocks noGrp="1" noRot="1" noChangeAspect="1"/>
           </p:cNvSpPr>
@@ -1265,7 +1414,7 @@
       </p:sp>
       <p:sp>
         <p:nvSpPr>
-          <p:cNvPr id="3" name="Notes Placeholder 2"/>
+          <p:cNvPr id="3" name="Symbol zastępczy notatek 2"/>
           <p:cNvSpPr>
             <a:spLocks noGrp="1"/>
           </p:cNvSpPr>
@@ -1278,35 +1427,13 @@
           <a:bodyPr/>
           <a:lstStyle/>
           <a:p>
-            <a:r>
-              <a:rPr lang="en-US" b="0" i="0" dirty="0">
-                <a:solidFill>
-                  <a:srgbClr val="222222"/>
-                </a:solidFill>
-                <a:effectLst/>
-                <a:latin typeface="Arial" panose="020B0604020202020204" pitchFamily="34" charset="0"/>
-              </a:rPr>
-              <a:t>Do the differences between the cars decrease over the years?</a:t>
-            </a:r>
-          </a:p>
-          <a:p>
-            <a:r>
-              <a:rPr lang="en-US" b="0" i="0" dirty="0">
-                <a:solidFill>
-                  <a:srgbClr val="222222"/>
-                </a:solidFill>
-                <a:effectLst/>
-                <a:latin typeface="Arial" panose="020B0604020202020204" pitchFamily="34" charset="0"/>
-              </a:rPr>
-              <a:t>To answer this question we have used a plot that shows the differences in the number of cars in the past years</a:t>
-            </a:r>
-            <a:endParaRPr lang="en-US" dirty="0"/>
-          </a:p>
-        </p:txBody>
-      </p:sp>
-      <p:sp>
-        <p:nvSpPr>
-          <p:cNvPr id="4" name="Slide Number Placeholder 3"/>
+            <a:endParaRPr lang="pl-PL" dirty="0"/>
+          </a:p>
+        </p:txBody>
+      </p:sp>
+      <p:sp>
+        <p:nvSpPr>
+          <p:cNvPr id="4" name="Symbol zastępczy numeru slajdu 3"/>
           <p:cNvSpPr>
             <a:spLocks noGrp="1"/>
           </p:cNvSpPr>
@@ -1321,7 +1448,7 @@
           <a:p>
             <a:fld id="{8B16C77F-3968-400F-9FFF-E15A5979D213}" type="slidenum">
               <a:rPr lang="en-US" smtClean="0"/>
-              <a:t>8</a:t>
+              <a:t>7</a:t>
             </a:fld>
             <a:endParaRPr lang="en-US"/>
           </a:p>
@@ -1330,7 +1457,7 @@
     </p:spTree>
     <p:extLst>
       <p:ext uri="{BB962C8B-B14F-4D97-AF65-F5344CB8AC3E}">
-        <p14:creationId xmlns:p14="http://schemas.microsoft.com/office/powerpoint/2010/main" val="500560726"/>
+        <p14:creationId xmlns:p14="http://schemas.microsoft.com/office/powerpoint/2010/main" val="4221663633"/>
       </p:ext>
     </p:extLst>
   </p:cSld>
@@ -1607,7 +1734,7 @@
           <a:p>
             <a:fld id="{276D79ED-3FA7-4EF8-964B-EB8BCFAB02F8}" type="datetimeFigureOut">
               <a:rPr lang="en-US" smtClean="0"/>
-              <a:t>1/21/21</a:t>
+              <a:t>1/22/21</a:t>
             </a:fld>
             <a:endParaRPr lang="en-US"/>
           </a:p>
@@ -1777,7 +1904,7 @@
           <a:p>
             <a:fld id="{276D79ED-3FA7-4EF8-964B-EB8BCFAB02F8}" type="datetimeFigureOut">
               <a:rPr lang="en-US" smtClean="0"/>
-              <a:t>1/21/21</a:t>
+              <a:t>1/22/21</a:t>
             </a:fld>
             <a:endParaRPr lang="en-US"/>
           </a:p>
@@ -2023,7 +2150,7 @@
           <a:p>
             <a:fld id="{276D79ED-3FA7-4EF8-964B-EB8BCFAB02F8}" type="datetimeFigureOut">
               <a:rPr lang="en-US" smtClean="0"/>
-              <a:t>1/21/21</a:t>
+              <a:t>1/22/21</a:t>
             </a:fld>
             <a:endParaRPr lang="en-US"/>
           </a:p>
@@ -2255,7 +2382,7 @@
           <a:p>
             <a:fld id="{276D79ED-3FA7-4EF8-964B-EB8BCFAB02F8}" type="datetimeFigureOut">
               <a:rPr lang="en-US" smtClean="0"/>
-              <a:t>1/21/21</a:t>
+              <a:t>1/22/21</a:t>
             </a:fld>
             <a:endParaRPr lang="en-US"/>
           </a:p>
@@ -2622,7 +2749,7 @@
           <a:p>
             <a:fld id="{276D79ED-3FA7-4EF8-964B-EB8BCFAB02F8}" type="datetimeFigureOut">
               <a:rPr lang="en-US" smtClean="0"/>
-              <a:t>1/21/21</a:t>
+              <a:t>1/22/21</a:t>
             </a:fld>
             <a:endParaRPr lang="en-US"/>
           </a:p>
@@ -2740,7 +2867,7 @@
           <a:p>
             <a:fld id="{276D79ED-3FA7-4EF8-964B-EB8BCFAB02F8}" type="datetimeFigureOut">
               <a:rPr lang="en-US" smtClean="0"/>
-              <a:t>1/21/21</a:t>
+              <a:t>1/22/21</a:t>
             </a:fld>
             <a:endParaRPr lang="en-US"/>
           </a:p>
@@ -2835,7 +2962,7 @@
           <a:p>
             <a:fld id="{276D79ED-3FA7-4EF8-964B-EB8BCFAB02F8}" type="datetimeFigureOut">
               <a:rPr lang="en-US" smtClean="0"/>
-              <a:t>1/21/21</a:t>
+              <a:t>1/22/21</a:t>
             </a:fld>
             <a:endParaRPr lang="en-US"/>
           </a:p>
@@ -3112,7 +3239,7 @@
           <a:p>
             <a:fld id="{276D79ED-3FA7-4EF8-964B-EB8BCFAB02F8}" type="datetimeFigureOut">
               <a:rPr lang="en-US" smtClean="0"/>
-              <a:t>1/21/21</a:t>
+              <a:t>1/22/21</a:t>
             </a:fld>
             <a:endParaRPr lang="en-US"/>
           </a:p>
@@ -3369,7 +3496,7 @@
           <a:p>
             <a:fld id="{276D79ED-3FA7-4EF8-964B-EB8BCFAB02F8}" type="datetimeFigureOut">
               <a:rPr lang="en-US" smtClean="0"/>
-              <a:t>1/21/21</a:t>
+              <a:t>1/22/21</a:t>
             </a:fld>
             <a:endParaRPr lang="en-US"/>
           </a:p>
@@ -3590,7 +3717,7 @@
             <a:fld id="{276D79ED-3FA7-4EF8-964B-EB8BCFAB02F8}" type="datetimeFigureOut">
               <a:rPr lang="en-US" smtClean="0"/>
               <a:pPr/>
-              <a:t>1/21/21</a:t>
+              <a:t>1/22/21</a:t>
             </a:fld>
             <a:endParaRPr lang="en-US"/>
           </a:p>
@@ -4204,7 +4331,7 @@
           <p:cNvPr id="2" name="Title 1">
             <a:extLst>
               <a:ext uri="{FF2B5EF4-FFF2-40B4-BE49-F238E27FC236}">
-                <a16:creationId xmlns:a16="http://schemas.microsoft.com/office/drawing/2014/main" id="{8F694C84-9122-407A-9335-7FF043C3E2A2}"/>
+                <a16:creationId xmlns:a16="http://schemas.microsoft.com/office/drawing/2014/main" id="{EEDF7E60-BEFF-4D9E-97E4-1C50543309DE}"/>
               </a:ext>
             </a:extLst>
           </p:cNvPr>
@@ -4220,7 +4347,17 @@
           <a:bodyPr/>
           <a:lstStyle/>
           <a:p>
-            <a:endParaRPr lang="en-US"/>
+            <a:r>
+              <a:rPr lang="en-US" b="0" i="0" dirty="0">
+                <a:solidFill>
+                  <a:srgbClr val="222222"/>
+                </a:solidFill>
+                <a:effectLst/>
+                <a:latin typeface="Arial" panose="020B0604020202020204" pitchFamily="34" charset="0"/>
+              </a:rPr>
+              <a:t>Which F1 circuits provide a more even fight?</a:t>
+            </a:r>
+            <a:endParaRPr lang="en-US" dirty="0"/>
           </a:p>
         </p:txBody>
       </p:sp>
@@ -4229,7 +4366,7 @@
           <p:cNvPr id="3" name="Content Placeholder 2">
             <a:extLst>
               <a:ext uri="{FF2B5EF4-FFF2-40B4-BE49-F238E27FC236}">
-                <a16:creationId xmlns:a16="http://schemas.microsoft.com/office/drawing/2014/main" id="{3367C7C9-20B6-4F7A-BF6E-D7967B105B94}"/>
+                <a16:creationId xmlns:a16="http://schemas.microsoft.com/office/drawing/2014/main" id="{8938693A-BE4E-41A4-8570-AADF18D1A1A5}"/>
               </a:ext>
             </a:extLst>
           </p:cNvPr>
@@ -4252,7 +4389,7 @@
     </p:spTree>
     <p:extLst>
       <p:ext uri="{BB962C8B-B14F-4D97-AF65-F5344CB8AC3E}">
-        <p14:creationId xmlns:p14="http://schemas.microsoft.com/office/powerpoint/2010/main" val="4132244438"/>
+        <p14:creationId xmlns:p14="http://schemas.microsoft.com/office/powerpoint/2010/main" val="441530103"/>
       </p:ext>
     </p:extLst>
   </p:cSld>
@@ -4281,41 +4418,6 @@
       </p:grpSpPr>
       <p:sp>
         <p:nvSpPr>
-          <p:cNvPr id="2" name="Title 1">
-            <a:extLst>
-              <a:ext uri="{FF2B5EF4-FFF2-40B4-BE49-F238E27FC236}">
-                <a16:creationId xmlns:a16="http://schemas.microsoft.com/office/drawing/2014/main" id="{EEDF7E60-BEFF-4D9E-97E4-1C50543309DE}"/>
-              </a:ext>
-            </a:extLst>
-          </p:cNvPr>
-          <p:cNvSpPr>
-            <a:spLocks noGrp="1"/>
-          </p:cNvSpPr>
-          <p:nvPr>
-            <p:ph type="title"/>
-          </p:nvPr>
-        </p:nvSpPr>
-        <p:spPr/>
-        <p:txBody>
-          <a:bodyPr/>
-          <a:lstStyle/>
-          <a:p>
-            <a:r>
-              <a:rPr lang="en-US" b="0" i="0" dirty="0">
-                <a:solidFill>
-                  <a:srgbClr val="222222"/>
-                </a:solidFill>
-                <a:effectLst/>
-                <a:latin typeface="Arial" panose="020B0604020202020204" pitchFamily="34" charset="0"/>
-              </a:rPr>
-              <a:t>Which F1 circuits provide a more even fight?</a:t>
-            </a:r>
-            <a:endParaRPr lang="en-US" dirty="0"/>
-          </a:p>
-        </p:txBody>
-      </p:sp>
-      <p:sp>
-        <p:nvSpPr>
           <p:cNvPr id="3" name="Content Placeholder 2">
             <a:extLst>
               <a:ext uri="{FF2B5EF4-FFF2-40B4-BE49-F238E27FC236}">
@@ -4330,19 +4432,39 @@
             <p:ph idx="1"/>
           </p:nvPr>
         </p:nvSpPr>
-        <p:spPr/>
-        <p:txBody>
-          <a:bodyPr/>
-          <a:lstStyle/>
-          <a:p>
-            <a:endParaRPr lang="en-US"/>
+        <p:spPr>
+          <a:xfrm>
+            <a:off x="838200" y="1235324"/>
+            <a:ext cx="10515600" cy="4387352"/>
+          </a:xfrm>
+        </p:spPr>
+        <p:txBody>
+          <a:bodyPr anchor="ctr">
+            <a:normAutofit/>
+          </a:bodyPr>
+          <a:lstStyle/>
+          <a:p>
+            <a:pPr marL="0" indent="0" algn="ctr">
+              <a:buNone/>
+            </a:pPr>
+            <a:r>
+              <a:rPr lang="en-US" sz="6000" dirty="0"/>
+              <a:t>Thank you </a:t>
+            </a:r>
+            <a:r>
+              <a:rPr lang="en-US" sz="6000" dirty="0">
+                <a:sym typeface="Wingdings" pitchFamily="2" charset="2"/>
+              </a:rPr>
+              <a:t>:)</a:t>
+            </a:r>
+            <a:endParaRPr lang="en-US" sz="6000" dirty="0"/>
           </a:p>
         </p:txBody>
       </p:sp>
     </p:spTree>
     <p:extLst>
       <p:ext uri="{BB962C8B-B14F-4D97-AF65-F5344CB8AC3E}">
-        <p14:creationId xmlns:p14="http://schemas.microsoft.com/office/powerpoint/2010/main" val="441530103"/>
+        <p14:creationId xmlns:p14="http://schemas.microsoft.com/office/powerpoint/2010/main" val="3720207929"/>
       </p:ext>
     </p:extLst>
   </p:cSld>
@@ -4352,7 +4474,7 @@
 </p:sld>
 </file>
 
-<file path=ppt/slides/slide12.xml><?xml version="1.0" encoding="utf-8"?>
+<file path=ppt/slides/slide2.xml><?xml version="1.0" encoding="utf-8"?>
 <p:sld xmlns:a="http://schemas.openxmlformats.org/drawingml/2006/main" xmlns:r="http://schemas.openxmlformats.org/officeDocument/2006/relationships" xmlns:p="http://schemas.openxmlformats.org/presentationml/2006/main">
   <p:cSld>
     <p:spTree>
@@ -4371,10 +4493,10 @@
       </p:grpSpPr>
       <p:sp>
         <p:nvSpPr>
-          <p:cNvPr id="2" name="Title 1">
+          <p:cNvPr id="2" name="Tytuł 1">
             <a:extLst>
               <a:ext uri="{FF2B5EF4-FFF2-40B4-BE49-F238E27FC236}">
-                <a16:creationId xmlns:a16="http://schemas.microsoft.com/office/drawing/2014/main" id="{B758140B-DA3C-4E1C-86A8-59DD2BA8B7C7}"/>
+                <a16:creationId xmlns:a16="http://schemas.microsoft.com/office/drawing/2014/main" id="{C2B7D4FF-31D8-4941-99F4-92DD7B5B5696}"/>
               </a:ext>
             </a:extLst>
           </p:cNvPr>
@@ -4390,16 +4512,20 @@
           <a:bodyPr/>
           <a:lstStyle/>
           <a:p>
-            <a:endParaRPr lang="en-US"/>
-          </a:p>
-        </p:txBody>
-      </p:sp>
-      <p:sp>
-        <p:nvSpPr>
-          <p:cNvPr id="3" name="Content Placeholder 2">
+            <a:r>
+              <a:rPr lang="en-ZW" dirty="0"/>
+              <a:t>Data Description</a:t>
+            </a:r>
+            <a:endParaRPr lang="pl-PL" dirty="0"/>
+          </a:p>
+        </p:txBody>
+      </p:sp>
+      <p:sp>
+        <p:nvSpPr>
+          <p:cNvPr id="3" name="Symbol zastępczy zawartości 2">
             <a:extLst>
               <a:ext uri="{FF2B5EF4-FFF2-40B4-BE49-F238E27FC236}">
-                <a16:creationId xmlns:a16="http://schemas.microsoft.com/office/drawing/2014/main" id="{26C33385-9021-401E-888D-847C296E1958}"/>
+                <a16:creationId xmlns:a16="http://schemas.microsoft.com/office/drawing/2014/main" id="{3031109E-5CA7-DE4D-B7EE-D72C66066559}"/>
               </a:ext>
             </a:extLst>
           </p:cNvPr>
@@ -4412,17 +4538,75 @@
         </p:nvSpPr>
         <p:spPr/>
         <p:txBody>
-          <a:bodyPr/>
-          <a:lstStyle/>
-          <a:p>
-            <a:endParaRPr lang="en-US"/>
+          <a:bodyPr>
+            <a:normAutofit lnSpcReduction="10000"/>
+          </a:bodyPr>
+          <a:lstStyle/>
+          <a:p>
+            <a:pPr>
+              <a:lnSpc>
+                <a:spcPct val="150000"/>
+              </a:lnSpc>
+            </a:pPr>
+            <a:r>
+              <a:rPr lang="en-ZW" dirty="0"/>
+              <a:t>Data set from Kaggle platform</a:t>
+            </a:r>
+          </a:p>
+          <a:p>
+            <a:pPr>
+              <a:lnSpc>
+                <a:spcPct val="150000"/>
+              </a:lnSpc>
+            </a:pPr>
+            <a:r>
+              <a:rPr lang="en-ZW" dirty="0"/>
+              <a:t>F1 seasons statistics from 1950 to 2020</a:t>
+            </a:r>
+          </a:p>
+          <a:p>
+            <a:pPr>
+              <a:lnSpc>
+                <a:spcPct val="150000"/>
+              </a:lnSpc>
+            </a:pPr>
+            <a:r>
+              <a:rPr lang="en-ZW" dirty="0"/>
+              <a:t>Problem statement : Challenge in comparing complex F1 data</a:t>
+            </a:r>
+          </a:p>
+          <a:p>
+            <a:pPr>
+              <a:lnSpc>
+                <a:spcPct val="150000"/>
+              </a:lnSpc>
+            </a:pPr>
+            <a:r>
+              <a:rPr lang="en-ZW" dirty="0"/>
+              <a:t>Aim of the project: Use visualisation techniques to analyse F1 data</a:t>
+            </a:r>
+          </a:p>
+          <a:p>
+            <a:pPr>
+              <a:lnSpc>
+                <a:spcPct val="150000"/>
+              </a:lnSpc>
+            </a:pPr>
+            <a:r>
+              <a:rPr lang="en-ZW" dirty="0"/>
+              <a:t>Data structure…</a:t>
+            </a:r>
+            <a:endParaRPr lang="pl-PL" dirty="0"/>
+          </a:p>
+          <a:p>
+            <a:endParaRPr lang="pl-PL" dirty="0"/>
           </a:p>
         </p:txBody>
       </p:sp>
     </p:spTree>
     <p:extLst>
       <p:ext uri="{BB962C8B-B14F-4D97-AF65-F5344CB8AC3E}">
-        <p14:creationId xmlns:p14="http://schemas.microsoft.com/office/powerpoint/2010/main" val="1146285114"/>
+        <p14:creationId xmlns:p14="http://schemas.microsoft.com/office/powerpoint/2010/main" val="2131014041"/>
       </p:ext>
     </p:extLst>
   </p:cSld>
@@ -4432,7 +4616,7 @@
 </p:sld>
 </file>
 
-<file path=ppt/slides/slide13.xml><?xml version="1.0" encoding="utf-8"?>
+<file path=ppt/slides/slide3.xml><?xml version="1.0" encoding="utf-8"?>
 <p:sld xmlns:a="http://schemas.openxmlformats.org/drawingml/2006/main" xmlns:r="http://schemas.openxmlformats.org/officeDocument/2006/relationships" xmlns:p="http://schemas.openxmlformats.org/presentationml/2006/main">
   <p:cSld>
     <p:spTree>
@@ -4449,60 +4633,46 @@
           <a:chExt cx="0" cy="0"/>
         </a:xfrm>
       </p:grpSpPr>
-      <p:sp>
-        <p:nvSpPr>
-          <p:cNvPr id="2" name="Title 1">
+      <p:pic>
+        <p:nvPicPr>
+          <p:cNvPr id="12" name="Obraz 11">
             <a:extLst>
               <a:ext uri="{FF2B5EF4-FFF2-40B4-BE49-F238E27FC236}">
-                <a16:creationId xmlns:a16="http://schemas.microsoft.com/office/drawing/2014/main" id="{C9B8B670-10AF-4670-9B5B-72C74EBED351}"/>
+                <a16:creationId xmlns:a16="http://schemas.microsoft.com/office/drawing/2014/main" id="{FFDCCD6B-F5C3-1943-AAB6-20BA2947C7CC}"/>
               </a:ext>
             </a:extLst>
           </p:cNvPr>
-          <p:cNvSpPr>
-            <a:spLocks noGrp="1"/>
-          </p:cNvSpPr>
-          <p:nvPr>
-            <p:ph type="title"/>
-          </p:nvPr>
-        </p:nvSpPr>
-        <p:spPr/>
-        <p:txBody>
-          <a:bodyPr/>
-          <a:lstStyle/>
-          <a:p>
-            <a:endParaRPr lang="en-US"/>
-          </a:p>
-        </p:txBody>
-      </p:sp>
-      <p:sp>
-        <p:nvSpPr>
-          <p:cNvPr id="3" name="Content Placeholder 2">
+          <p:cNvPicPr>
+            <a:picLocks noChangeAspect="1"/>
+          </p:cNvPicPr>
+          <p:nvPr/>
+        </p:nvPicPr>
+        <p:blipFill>
+          <a:blip r:embed="rId3">
             <a:extLst>
-              <a:ext uri="{FF2B5EF4-FFF2-40B4-BE49-F238E27FC236}">
-                <a16:creationId xmlns:a16="http://schemas.microsoft.com/office/drawing/2014/main" id="{38028842-3987-4655-AC3E-B9CF6EC8EF61}"/>
+              <a:ext uri="{28A0092B-C50C-407E-A947-70E740481C1C}">
+                <a14:useLocalDpi xmlns:a14="http://schemas.microsoft.com/office/drawing/2010/main" val="0"/>
               </a:ext>
             </a:extLst>
-          </p:cNvPr>
-          <p:cNvSpPr>
-            <a:spLocks noGrp="1"/>
-          </p:cNvSpPr>
-          <p:nvPr>
-            <p:ph idx="1"/>
-          </p:nvPr>
-        </p:nvSpPr>
-        <p:spPr/>
-        <p:txBody>
-          <a:bodyPr/>
-          <a:lstStyle/>
-          <a:p>
-            <a:endParaRPr lang="en-US"/>
-          </a:p>
-        </p:txBody>
-      </p:sp>
+          </a:blip>
+          <a:stretch>
+            <a:fillRect/>
+          </a:stretch>
+        </p:blipFill>
+        <p:spPr>
+          <a:xfrm>
+            <a:off x="738373" y="0"/>
+            <a:ext cx="9816353" cy="6858000"/>
+          </a:xfrm>
+          <a:prstGeom prst="rect">
+            <a:avLst/>
+          </a:prstGeom>
+        </p:spPr>
+      </p:pic>
     </p:spTree>
     <p:extLst>
       <p:ext uri="{BB962C8B-B14F-4D97-AF65-F5344CB8AC3E}">
-        <p14:creationId xmlns:p14="http://schemas.microsoft.com/office/powerpoint/2010/main" val="1593929526"/>
+        <p14:creationId xmlns:p14="http://schemas.microsoft.com/office/powerpoint/2010/main" val="3157912684"/>
       </p:ext>
     </p:extLst>
   </p:cSld>
@@ -4512,7 +4682,7 @@
 </p:sld>
 </file>
 
-<file path=ppt/slides/slide2.xml><?xml version="1.0" encoding="utf-8"?>
+<file path=ppt/slides/slide4.xml><?xml version="1.0" encoding="utf-8"?>
 <p:sld xmlns:a="http://schemas.openxmlformats.org/drawingml/2006/main" xmlns:r="http://schemas.openxmlformats.org/officeDocument/2006/relationships" xmlns:p="http://schemas.openxmlformats.org/presentationml/2006/main">
   <p:cSld>
     <p:spTree>
@@ -4630,7 +4800,7 @@
 </p:sld>
 </file>
 
-<file path=ppt/slides/slide3.xml><?xml version="1.0" encoding="utf-8"?>
+<file path=ppt/slides/slide5.xml><?xml version="1.0" encoding="utf-8"?>
 <p:sld xmlns:a="http://schemas.openxmlformats.org/drawingml/2006/main" xmlns:r="http://schemas.openxmlformats.org/officeDocument/2006/relationships" xmlns:p="http://schemas.openxmlformats.org/presentationml/2006/main">
   <p:cSld>
     <p:spTree>
@@ -4652,90 +4822,6 @@
           <p:cNvPr id="2" name="Tytuł 1">
             <a:extLst>
               <a:ext uri="{FF2B5EF4-FFF2-40B4-BE49-F238E27FC236}">
-                <a16:creationId xmlns:a16="http://schemas.microsoft.com/office/drawing/2014/main" id="{C2B7D4FF-31D8-4941-99F4-92DD7B5B5696}"/>
-              </a:ext>
-            </a:extLst>
-          </p:cNvPr>
-          <p:cNvSpPr>
-            <a:spLocks noGrp="1"/>
-          </p:cNvSpPr>
-          <p:nvPr>
-            <p:ph type="title"/>
-          </p:nvPr>
-        </p:nvSpPr>
-        <p:spPr/>
-        <p:txBody>
-          <a:bodyPr/>
-          <a:lstStyle/>
-          <a:p>
-            <a:r>
-              <a:rPr lang="en-ZW" dirty="0"/>
-              <a:t>Data Description</a:t>
-            </a:r>
-            <a:endParaRPr lang="pl-PL" dirty="0"/>
-          </a:p>
-        </p:txBody>
-      </p:sp>
-      <p:sp>
-        <p:nvSpPr>
-          <p:cNvPr id="3" name="Symbol zastępczy zawartości 2">
-            <a:extLst>
-              <a:ext uri="{FF2B5EF4-FFF2-40B4-BE49-F238E27FC236}">
-                <a16:creationId xmlns:a16="http://schemas.microsoft.com/office/drawing/2014/main" id="{3031109E-5CA7-DE4D-B7EE-D72C66066559}"/>
-              </a:ext>
-            </a:extLst>
-          </p:cNvPr>
-          <p:cNvSpPr>
-            <a:spLocks noGrp="1"/>
-          </p:cNvSpPr>
-          <p:nvPr>
-            <p:ph idx="1"/>
-          </p:nvPr>
-        </p:nvSpPr>
-        <p:spPr/>
-        <p:txBody>
-          <a:bodyPr/>
-          <a:lstStyle/>
-          <a:p>
-            <a:endParaRPr lang="pl-PL" dirty="0"/>
-          </a:p>
-        </p:txBody>
-      </p:sp>
-    </p:spTree>
-    <p:extLst>
-      <p:ext uri="{BB962C8B-B14F-4D97-AF65-F5344CB8AC3E}">
-        <p14:creationId xmlns:p14="http://schemas.microsoft.com/office/powerpoint/2010/main" val="2131014041"/>
-      </p:ext>
-    </p:extLst>
-  </p:cSld>
-  <p:clrMapOvr>
-    <a:masterClrMapping/>
-  </p:clrMapOvr>
-</p:sld>
-</file>
-
-<file path=ppt/slides/slide4.xml><?xml version="1.0" encoding="utf-8"?>
-<p:sld xmlns:a="http://schemas.openxmlformats.org/drawingml/2006/main" xmlns:r="http://schemas.openxmlformats.org/officeDocument/2006/relationships" xmlns:p="http://schemas.openxmlformats.org/presentationml/2006/main">
-  <p:cSld>
-    <p:spTree>
-      <p:nvGrpSpPr>
-        <p:cNvPr id="1" name=""/>
-        <p:cNvGrpSpPr/>
-        <p:nvPr/>
-      </p:nvGrpSpPr>
-      <p:grpSpPr>
-        <a:xfrm>
-          <a:off x="0" y="0"/>
-          <a:ext cx="0" cy="0"/>
-          <a:chOff x="0" y="0"/>
-          <a:chExt cx="0" cy="0"/>
-        </a:xfrm>
-      </p:grpSpPr>
-      <p:sp>
-        <p:nvSpPr>
-          <p:cNvPr id="2" name="Tytuł 1">
-            <a:extLst>
-              <a:ext uri="{FF2B5EF4-FFF2-40B4-BE49-F238E27FC236}">
                 <a16:creationId xmlns:a16="http://schemas.microsoft.com/office/drawing/2014/main" id="{E01D4C7B-ECF8-9446-AAC7-375DCFD65EC6}"/>
               </a:ext>
             </a:extLst>
@@ -4747,7 +4833,12 @@
             <p:ph type="title"/>
           </p:nvPr>
         </p:nvSpPr>
-        <p:spPr/>
+        <p:spPr>
+          <a:xfrm>
+            <a:off x="838200" y="2426400"/>
+            <a:ext cx="10515600" cy="1325563"/>
+          </a:xfrm>
+        </p:spPr>
         <p:txBody>
           <a:bodyPr/>
           <a:lstStyle/>
@@ -4760,36 +4851,8 @@
                 <a:effectLst/>
                 <a:latin typeface="Arial" panose="020B0604020202020204" pitchFamily="34" charset="0"/>
               </a:rPr>
-              <a:t>How has the competition and level of F1 changed over the years?</a:t>
-            </a:r>
-            <a:endParaRPr lang="pl-PL" dirty="0"/>
-          </a:p>
-        </p:txBody>
-      </p:sp>
-      <p:sp>
-        <p:nvSpPr>
-          <p:cNvPr id="3" name="Symbol zastępczy zawartości 2">
-            <a:extLst>
-              <a:ext uri="{FF2B5EF4-FFF2-40B4-BE49-F238E27FC236}">
-                <a16:creationId xmlns:a16="http://schemas.microsoft.com/office/drawing/2014/main" id="{48FD43A4-4786-9C47-8FE2-BD81D898CEB2}"/>
-              </a:ext>
-            </a:extLst>
-          </p:cNvPr>
-          <p:cNvSpPr>
-            <a:spLocks noGrp="1"/>
-          </p:cNvSpPr>
-          <p:nvPr>
-            <p:ph idx="1"/>
-          </p:nvPr>
-        </p:nvSpPr>
-        <p:spPr/>
-        <p:txBody>
-          <a:bodyPr/>
-          <a:lstStyle/>
-          <a:p>
-            <a:pPr marL="0" indent="0">
-              <a:buNone/>
-            </a:pPr>
+              <a:t>How has the competition changed over the years?</a:t>
+            </a:r>
             <a:endParaRPr lang="pl-PL" dirty="0"/>
           </a:p>
         </p:txBody>
@@ -4807,7 +4870,7 @@
 </p:sld>
 </file>
 
-<file path=ppt/slides/slide5.xml><?xml version="1.0" encoding="utf-8"?>
+<file path=ppt/slides/slide6.xml><?xml version="1.0" encoding="utf-8"?>
 <p:sld xmlns:a="http://schemas.openxmlformats.org/drawingml/2006/main" xmlns:r="http://schemas.openxmlformats.org/officeDocument/2006/relationships" xmlns:p="http://schemas.openxmlformats.org/presentationml/2006/main">
   <p:cSld>
     <p:spTree>
@@ -4880,7 +4943,7 @@
 </p:sld>
 </file>
 
-<file path=ppt/slides/slide6.xml><?xml version="1.0" encoding="utf-8"?>
+<file path=ppt/slides/slide7.xml><?xml version="1.0" encoding="utf-8"?>
 <p:sld xmlns:a="http://schemas.openxmlformats.org/drawingml/2006/main" xmlns:r="http://schemas.openxmlformats.org/officeDocument/2006/relationships" xmlns:p="http://schemas.openxmlformats.org/presentationml/2006/main">
   <p:cSld>
     <p:spTree>
@@ -4945,90 +5008,6 @@
 </p:sld>
 </file>
 
-<file path=ppt/slides/slide7.xml><?xml version="1.0" encoding="utf-8"?>
-<p:sld xmlns:a="http://schemas.openxmlformats.org/drawingml/2006/main" xmlns:r="http://schemas.openxmlformats.org/officeDocument/2006/relationships" xmlns:p="http://schemas.openxmlformats.org/presentationml/2006/main">
-  <p:cSld>
-    <p:spTree>
-      <p:nvGrpSpPr>
-        <p:cNvPr id="1" name=""/>
-        <p:cNvGrpSpPr/>
-        <p:nvPr/>
-      </p:nvGrpSpPr>
-      <p:grpSpPr>
-        <a:xfrm>
-          <a:off x="0" y="0"/>
-          <a:ext cx="0" cy="0"/>
-          <a:chOff x="0" y="0"/>
-          <a:chExt cx="0" cy="0"/>
-        </a:xfrm>
-      </p:grpSpPr>
-      <p:sp>
-        <p:nvSpPr>
-          <p:cNvPr id="2" name="Title 1">
-            <a:extLst>
-              <a:ext uri="{FF2B5EF4-FFF2-40B4-BE49-F238E27FC236}">
-                <a16:creationId xmlns:a16="http://schemas.microsoft.com/office/drawing/2014/main" id="{5385545E-93B3-4401-A97C-0AFE614D2551}"/>
-              </a:ext>
-            </a:extLst>
-          </p:cNvPr>
-          <p:cNvSpPr>
-            <a:spLocks noGrp="1"/>
-          </p:cNvSpPr>
-          <p:nvPr>
-            <p:ph type="title"/>
-          </p:nvPr>
-        </p:nvSpPr>
-        <p:spPr/>
-        <p:txBody>
-          <a:bodyPr/>
-          <a:lstStyle/>
-          <a:p>
-            <a:r>
-              <a:rPr lang="en-ZW" dirty="0"/>
-              <a:t>Speed of top 10 over the years</a:t>
-            </a:r>
-            <a:endParaRPr lang="en-US" dirty="0"/>
-          </a:p>
-        </p:txBody>
-      </p:sp>
-      <p:sp>
-        <p:nvSpPr>
-          <p:cNvPr id="3" name="Content Placeholder 2">
-            <a:extLst>
-              <a:ext uri="{FF2B5EF4-FFF2-40B4-BE49-F238E27FC236}">
-                <a16:creationId xmlns:a16="http://schemas.microsoft.com/office/drawing/2014/main" id="{FA41D7D3-6AB0-4AD8-AA68-3A740B3C9E19}"/>
-              </a:ext>
-            </a:extLst>
-          </p:cNvPr>
-          <p:cNvSpPr>
-            <a:spLocks noGrp="1"/>
-          </p:cNvSpPr>
-          <p:nvPr>
-            <p:ph idx="1"/>
-          </p:nvPr>
-        </p:nvSpPr>
-        <p:spPr/>
-        <p:txBody>
-          <a:bodyPr/>
-          <a:lstStyle/>
-          <a:p>
-            <a:endParaRPr lang="en-US"/>
-          </a:p>
-        </p:txBody>
-      </p:sp>
-    </p:spTree>
-    <p:extLst>
-      <p:ext uri="{BB962C8B-B14F-4D97-AF65-F5344CB8AC3E}">
-        <p14:creationId xmlns:p14="http://schemas.microsoft.com/office/powerpoint/2010/main" val="1763201549"/>
-      </p:ext>
-    </p:extLst>
-  </p:cSld>
-  <p:clrMapOvr>
-    <a:masterClrMapping/>
-  </p:clrMapOvr>
-</p:sld>
-</file>
-
 <file path=ppt/slides/slide8.xml><?xml version="1.0" encoding="utf-8"?>
 <p:sld xmlns:a="http://schemas.openxmlformats.org/drawingml/2006/main" xmlns:r="http://schemas.openxmlformats.org/officeDocument/2006/relationships" xmlns:p="http://schemas.openxmlformats.org/presentationml/2006/main">
   <p:cSld>
@@ -5048,10 +5027,10 @@
       </p:grpSpPr>
       <p:sp>
         <p:nvSpPr>
-          <p:cNvPr id="2" name="Tytuł 1">
+          <p:cNvPr id="3" name="Symbol zastępczy zawartości 2">
             <a:extLst>
               <a:ext uri="{FF2B5EF4-FFF2-40B4-BE49-F238E27FC236}">
-                <a16:creationId xmlns:a16="http://schemas.microsoft.com/office/drawing/2014/main" id="{E39ADD3F-8B20-4D46-890F-ABDA09A98334}"/>
+                <a16:creationId xmlns:a16="http://schemas.microsoft.com/office/drawing/2014/main" id="{8790B60C-5939-034D-959B-E14E58BBA4DB}"/>
               </a:ext>
             </a:extLst>
           </p:cNvPr>
@@ -5059,62 +5038,47 @@
             <a:spLocks noGrp="1"/>
           </p:cNvSpPr>
           <p:nvPr>
-            <p:ph type="title"/>
-          </p:nvPr>
-        </p:nvSpPr>
-        <p:spPr/>
-        <p:txBody>
-          <a:bodyPr>
-            <a:normAutofit fontScale="90000"/>
+            <p:ph idx="1"/>
+          </p:nvPr>
+        </p:nvSpPr>
+        <p:spPr>
+          <a:xfrm>
+            <a:off x="838200" y="1235324"/>
+            <a:ext cx="10515600" cy="4387352"/>
+          </a:xfrm>
+        </p:spPr>
+        <p:txBody>
+          <a:bodyPr anchor="ctr">
+            <a:normAutofit/>
           </a:bodyPr>
           <a:lstStyle/>
           <a:p>
-            <a:r>
-              <a:rPr lang="en-US" b="0" i="0" dirty="0">
-                <a:solidFill>
-                  <a:srgbClr val="222222"/>
-                </a:solidFill>
-                <a:effectLst/>
-                <a:latin typeface="Arial" panose="020B0604020202020204" pitchFamily="34" charset="0"/>
-              </a:rPr>
-              <a:t>Difference in the cars decrease over the years?</a:t>
-            </a:r>
-            <a:br>
-              <a:rPr lang="en-US" dirty="0"/>
-            </a:br>
-            <a:endParaRPr lang="pl-PL" dirty="0"/>
-          </a:p>
-        </p:txBody>
-      </p:sp>
-      <p:sp>
-        <p:nvSpPr>
-          <p:cNvPr id="3" name="Symbol zastępczy zawartości 2">
-            <a:extLst>
-              <a:ext uri="{FF2B5EF4-FFF2-40B4-BE49-F238E27FC236}">
-                <a16:creationId xmlns:a16="http://schemas.microsoft.com/office/drawing/2014/main" id="{4803CACD-3C69-DB4D-9CEB-DD715DEBBD68}"/>
-              </a:ext>
-            </a:extLst>
-          </p:cNvPr>
-          <p:cNvSpPr>
-            <a:spLocks noGrp="1"/>
-          </p:cNvSpPr>
-          <p:nvPr>
-            <p:ph idx="1"/>
-          </p:nvPr>
-        </p:nvSpPr>
-        <p:spPr/>
-        <p:txBody>
-          <a:bodyPr/>
-          <a:lstStyle/>
-          <a:p>
-            <a:endParaRPr lang="pl-PL"/>
+            <a:pPr marL="0" indent="0" algn="ctr">
+              <a:buNone/>
+            </a:pPr>
+            <a:r>
+              <a:rPr lang="pl-PL" sz="4400" dirty="0" err="1"/>
+              <a:t>Is</a:t>
+            </a:r>
+            <a:r>
+              <a:rPr lang="pl-PL" sz="4400" dirty="0"/>
+              <a:t> the race won in </a:t>
+            </a:r>
+            <a:r>
+              <a:rPr lang="pl-PL" sz="4400" dirty="0" err="1"/>
+              <a:t>qualifying</a:t>
+            </a:r>
+            <a:r>
+              <a:rPr lang="pl-PL" sz="4400" dirty="0"/>
+              <a:t>?</a:t>
+            </a:r>
           </a:p>
         </p:txBody>
       </p:sp>
     </p:spTree>
     <p:extLst>
       <p:ext uri="{BB962C8B-B14F-4D97-AF65-F5344CB8AC3E}">
-        <p14:creationId xmlns:p14="http://schemas.microsoft.com/office/powerpoint/2010/main" val="2834576460"/>
+        <p14:creationId xmlns:p14="http://schemas.microsoft.com/office/powerpoint/2010/main" val="246367448"/>
       </p:ext>
     </p:extLst>
   </p:cSld>

</xml_diff>